<commit_message>
Add runTimer, fix button aspect ratio, added popup for stop button
</commit_message>
<xml_diff>
--- a/Assets/RF1_iOS Image Assets.pptx
+++ b/Assets/RF1_iOS Image Assets.pptx
@@ -5,7 +5,7 @@
     <p:sldMasterId id="2147483660" r:id="rId1"/>
   </p:sldMasterIdLst>
   <p:notesMasterIdLst>
-    <p:notesMasterId r:id="rId12"/>
+    <p:notesMasterId r:id="rId13"/>
   </p:notesMasterIdLst>
   <p:sldIdLst>
     <p:sldId id="256" r:id="rId2"/>
@@ -13,11 +13,12 @@
     <p:sldId id="263" r:id="rId4"/>
     <p:sldId id="264" r:id="rId5"/>
     <p:sldId id="265" r:id="rId6"/>
-    <p:sldId id="262" r:id="rId7"/>
-    <p:sldId id="259" r:id="rId8"/>
-    <p:sldId id="257" r:id="rId9"/>
-    <p:sldId id="258" r:id="rId10"/>
-    <p:sldId id="260" r:id="rId11"/>
+    <p:sldId id="266" r:id="rId7"/>
+    <p:sldId id="262" r:id="rId8"/>
+    <p:sldId id="259" r:id="rId9"/>
+    <p:sldId id="257" r:id="rId10"/>
+    <p:sldId id="258" r:id="rId11"/>
+    <p:sldId id="260" r:id="rId12"/>
   </p:sldIdLst>
   <p:sldSz cx="9144000" cy="6858000" type="screen4x3"/>
   <p:notesSz cx="6858000" cy="9144000"/>
@@ -206,7 +207,7 @@
           <a:p>
             <a:fld id="{8F2978D3-65C1-0248-AA8D-E71F44BA97A8}" type="datetimeFigureOut">
               <a:rPr lang="en-US" smtClean="0"/>
-              <a:t>3/15/18</a:t>
+              <a:t>3/19/18</a:t>
             </a:fld>
             <a:endParaRPr lang="en-US"/>
           </a:p>
@@ -553,7 +554,7 @@
           <a:p>
             <a:fld id="{1EB18CB5-5427-B64F-A737-9ACE019C8FC1}" type="slidenum">
               <a:rPr lang="en-US" smtClean="0"/>
-              <a:t>8</a:t>
+              <a:t>9</a:t>
             </a:fld>
             <a:endParaRPr lang="en-US"/>
           </a:p>
@@ -703,7 +704,7 @@
           <a:p>
             <a:fld id="{AAF431F5-6ABC-B944-AA89-A7441EE7FB39}" type="datetimeFigureOut">
               <a:rPr lang="en-US" smtClean="0"/>
-              <a:t>3/15/18</a:t>
+              <a:t>3/19/18</a:t>
             </a:fld>
             <a:endParaRPr lang="en-US"/>
           </a:p>
@@ -868,7 +869,7 @@
           <a:p>
             <a:fld id="{AAF431F5-6ABC-B944-AA89-A7441EE7FB39}" type="datetimeFigureOut">
               <a:rPr lang="en-US" smtClean="0"/>
-              <a:t>3/15/18</a:t>
+              <a:t>3/19/18</a:t>
             </a:fld>
             <a:endParaRPr lang="en-US"/>
           </a:p>
@@ -1043,7 +1044,7 @@
           <a:p>
             <a:fld id="{AAF431F5-6ABC-B944-AA89-A7441EE7FB39}" type="datetimeFigureOut">
               <a:rPr lang="en-US" smtClean="0"/>
-              <a:t>3/15/18</a:t>
+              <a:t>3/19/18</a:t>
             </a:fld>
             <a:endParaRPr lang="en-US"/>
           </a:p>
@@ -1208,7 +1209,7 @@
           <a:p>
             <a:fld id="{AAF431F5-6ABC-B944-AA89-A7441EE7FB39}" type="datetimeFigureOut">
               <a:rPr lang="en-US" smtClean="0"/>
-              <a:t>3/15/18</a:t>
+              <a:t>3/19/18</a:t>
             </a:fld>
             <a:endParaRPr lang="en-US"/>
           </a:p>
@@ -1447,7 +1448,7 @@
           <a:p>
             <a:fld id="{AAF431F5-6ABC-B944-AA89-A7441EE7FB39}" type="datetimeFigureOut">
               <a:rPr lang="en-US" smtClean="0"/>
-              <a:t>3/15/18</a:t>
+              <a:t>3/19/18</a:t>
             </a:fld>
             <a:endParaRPr lang="en-US"/>
           </a:p>
@@ -1674,7 +1675,7 @@
           <a:p>
             <a:fld id="{AAF431F5-6ABC-B944-AA89-A7441EE7FB39}" type="datetimeFigureOut">
               <a:rPr lang="en-US" smtClean="0"/>
-              <a:t>3/15/18</a:t>
+              <a:t>3/19/18</a:t>
             </a:fld>
             <a:endParaRPr lang="en-US"/>
           </a:p>
@@ -2036,7 +2037,7 @@
           <a:p>
             <a:fld id="{AAF431F5-6ABC-B944-AA89-A7441EE7FB39}" type="datetimeFigureOut">
               <a:rPr lang="en-US" smtClean="0"/>
-              <a:t>3/15/18</a:t>
+              <a:t>3/19/18</a:t>
             </a:fld>
             <a:endParaRPr lang="en-US"/>
           </a:p>
@@ -2149,7 +2150,7 @@
           <a:p>
             <a:fld id="{AAF431F5-6ABC-B944-AA89-A7441EE7FB39}" type="datetimeFigureOut">
               <a:rPr lang="en-US" smtClean="0"/>
-              <a:t>3/15/18</a:t>
+              <a:t>3/19/18</a:t>
             </a:fld>
             <a:endParaRPr lang="en-US"/>
           </a:p>
@@ -2239,7 +2240,7 @@
           <a:p>
             <a:fld id="{AAF431F5-6ABC-B944-AA89-A7441EE7FB39}" type="datetimeFigureOut">
               <a:rPr lang="en-US" smtClean="0"/>
-              <a:t>3/15/18</a:t>
+              <a:t>3/19/18</a:t>
             </a:fld>
             <a:endParaRPr lang="en-US"/>
           </a:p>
@@ -2511,7 +2512,7 @@
           <a:p>
             <a:fld id="{AAF431F5-6ABC-B944-AA89-A7441EE7FB39}" type="datetimeFigureOut">
               <a:rPr lang="en-US" smtClean="0"/>
-              <a:t>3/15/18</a:t>
+              <a:t>3/19/18</a:t>
             </a:fld>
             <a:endParaRPr lang="en-US"/>
           </a:p>
@@ -2763,7 +2764,7 @@
           <a:p>
             <a:fld id="{AAF431F5-6ABC-B944-AA89-A7441EE7FB39}" type="datetimeFigureOut">
               <a:rPr lang="en-US" smtClean="0"/>
-              <a:t>3/15/18</a:t>
+              <a:t>3/19/18</a:t>
             </a:fld>
             <a:endParaRPr lang="en-US"/>
           </a:p>
@@ -2971,7 +2972,7 @@
           <a:p>
             <a:fld id="{AAF431F5-6ABC-B944-AA89-A7441EE7FB39}" type="datetimeFigureOut">
               <a:rPr lang="en-US" smtClean="0"/>
-              <a:t>3/15/18</a:t>
+              <a:t>3/19/18</a:t>
             </a:fld>
             <a:endParaRPr lang="en-US"/>
           </a:p>
@@ -3436,6 +3437,1010 @@
 </file>
 
 <file path=ppt/slides/slide10.xml><?xml version="1.0" encoding="utf-8"?>
+<p:sld xmlns:a="http://schemas.openxmlformats.org/drawingml/2006/main" xmlns:r="http://schemas.openxmlformats.org/officeDocument/2006/relationships" xmlns:p="http://schemas.openxmlformats.org/presentationml/2006/main">
+  <p:cSld>
+    <p:spTree>
+      <p:nvGrpSpPr>
+        <p:cNvPr id="1" name=""/>
+        <p:cNvGrpSpPr/>
+        <p:nvPr/>
+      </p:nvGrpSpPr>
+      <p:grpSpPr>
+        <a:xfrm>
+          <a:off x="0" y="0"/>
+          <a:ext cx="0" cy="0"/>
+          <a:chOff x="0" y="0"/>
+          <a:chExt cx="0" cy="0"/>
+        </a:xfrm>
+      </p:grpSpPr>
+      <p:sp>
+        <p:nvSpPr>
+          <p:cNvPr id="17" name="Rounded Rectangle 16"/>
+          <p:cNvSpPr/>
+          <p:nvPr/>
+        </p:nvSpPr>
+        <p:spPr>
+          <a:xfrm>
+            <a:off x="238539" y="114791"/>
+            <a:ext cx="9144000" cy="3269210"/>
+          </a:xfrm>
+          <a:prstGeom prst="roundRect">
+            <a:avLst/>
+          </a:prstGeom>
+          <a:solidFill>
+            <a:schemeClr val="tx1"/>
+          </a:solidFill>
+          <a:effectLst>
+            <a:outerShdw blurRad="63500" sx="102000" sy="102000" algn="ctr" rotWithShape="0">
+              <a:prstClr val="black">
+                <a:alpha val="40000"/>
+              </a:prstClr>
+            </a:outerShdw>
+          </a:effectLst>
+        </p:spPr>
+        <p:style>
+          <a:lnRef idx="2">
+            <a:schemeClr val="accent1">
+              <a:shade val="50000"/>
+            </a:schemeClr>
+          </a:lnRef>
+          <a:fillRef idx="1">
+            <a:schemeClr val="accent1"/>
+          </a:fillRef>
+          <a:effectRef idx="0">
+            <a:schemeClr val="accent1"/>
+          </a:effectRef>
+          <a:fontRef idx="minor">
+            <a:schemeClr val="lt1"/>
+          </a:fontRef>
+        </p:style>
+        <p:txBody>
+          <a:bodyPr rtlCol="0" anchor="ctr"/>
+          <a:lstStyle/>
+          <a:p>
+            <a:pPr algn="ctr"/>
+            <a:endParaRPr lang="en-US"/>
+          </a:p>
+        </p:txBody>
+      </p:sp>
+      <p:grpSp>
+        <p:nvGrpSpPr>
+          <p:cNvPr id="18" name="Group 17"/>
+          <p:cNvGrpSpPr/>
+          <p:nvPr/>
+        </p:nvGrpSpPr>
+        <p:grpSpPr>
+          <a:xfrm>
+            <a:off x="518906" y="192847"/>
+            <a:ext cx="9183755" cy="2908062"/>
+            <a:chOff x="187602" y="3214342"/>
+            <a:chExt cx="9183755" cy="2908062"/>
+          </a:xfrm>
+        </p:grpSpPr>
+        <p:grpSp>
+          <p:nvGrpSpPr>
+            <p:cNvPr id="11" name="Group 10"/>
+            <p:cNvGrpSpPr/>
+            <p:nvPr/>
+          </p:nvGrpSpPr>
+          <p:grpSpPr>
+            <a:xfrm>
+              <a:off x="187602" y="3214342"/>
+              <a:ext cx="2709896" cy="2908062"/>
+              <a:chOff x="5474619" y="2590316"/>
+              <a:chExt cx="2042419" cy="2191775"/>
+            </a:xfrm>
+          </p:grpSpPr>
+          <p:sp>
+            <p:nvSpPr>
+              <p:cNvPr id="12" name="Triangle 11"/>
+              <p:cNvSpPr/>
+              <p:nvPr/>
+            </p:nvSpPr>
+            <p:spPr>
+              <a:xfrm rot="10800000">
+                <a:off x="5474619" y="3021385"/>
+                <a:ext cx="2042419" cy="1760706"/>
+              </a:xfrm>
+              <a:prstGeom prst="triangle">
+                <a:avLst/>
+              </a:prstGeom>
+              <a:solidFill>
+                <a:schemeClr val="bg1"/>
+              </a:solidFill>
+              <a:ln>
+                <a:solidFill>
+                  <a:schemeClr val="bg1"/>
+                </a:solidFill>
+              </a:ln>
+              <a:effectLst>
+                <a:innerShdw blurRad="63500" dist="50800">
+                  <a:prstClr val="black">
+                    <a:alpha val="50000"/>
+                  </a:prstClr>
+                </a:innerShdw>
+                <a:softEdge rad="12700"/>
+              </a:effectLst>
+            </p:spPr>
+            <p:style>
+              <a:lnRef idx="2">
+                <a:schemeClr val="accent1">
+                  <a:shade val="50000"/>
+                </a:schemeClr>
+              </a:lnRef>
+              <a:fillRef idx="1">
+                <a:schemeClr val="accent1"/>
+              </a:fillRef>
+              <a:effectRef idx="0">
+                <a:schemeClr val="accent1"/>
+              </a:effectRef>
+              <a:fontRef idx="minor">
+                <a:schemeClr val="lt1"/>
+              </a:fontRef>
+            </p:style>
+            <p:txBody>
+              <a:bodyPr rtlCol="0" anchor="ctr"/>
+              <a:lstStyle/>
+              <a:p>
+                <a:pPr algn="ctr"/>
+                <a:endParaRPr lang="en-US"/>
+              </a:p>
+            </p:txBody>
+          </p:sp>
+          <p:sp>
+            <p:nvSpPr>
+              <p:cNvPr id="13" name="Freeform 12"/>
+              <p:cNvSpPr/>
+              <p:nvPr/>
+            </p:nvSpPr>
+            <p:spPr>
+              <a:xfrm>
+                <a:off x="6018203" y="3625933"/>
+                <a:ext cx="971991" cy="275075"/>
+              </a:xfrm>
+              <a:custGeom>
+                <a:avLst/>
+                <a:gdLst>
+                  <a:gd name="connsiteX0" fmla="*/ 0 w 971991"/>
+                  <a:gd name="connsiteY0" fmla="*/ 0 h 275075"/>
+                  <a:gd name="connsiteX1" fmla="*/ 136099 w 971991"/>
+                  <a:gd name="connsiteY1" fmla="*/ 0 h 275075"/>
+                  <a:gd name="connsiteX2" fmla="*/ 139195 w 971991"/>
+                  <a:gd name="connsiteY2" fmla="*/ 13789 h 275075"/>
+                  <a:gd name="connsiteX3" fmla="*/ 485995 w 971991"/>
+                  <a:gd name="connsiteY3" fmla="*/ 140704 h 275075"/>
+                  <a:gd name="connsiteX4" fmla="*/ 832795 w 971991"/>
+                  <a:gd name="connsiteY4" fmla="*/ 13789 h 275075"/>
+                  <a:gd name="connsiteX5" fmla="*/ 835891 w 971991"/>
+                  <a:gd name="connsiteY5" fmla="*/ 0 h 275075"/>
+                  <a:gd name="connsiteX6" fmla="*/ 971991 w 971991"/>
+                  <a:gd name="connsiteY6" fmla="*/ 0 h 275075"/>
+                  <a:gd name="connsiteX7" fmla="*/ 965121 w 971991"/>
+                  <a:gd name="connsiteY7" fmla="*/ 40870 h 275075"/>
+                  <a:gd name="connsiteX8" fmla="*/ 485995 w 971991"/>
+                  <a:gd name="connsiteY8" fmla="*/ 275075 h 275075"/>
+                  <a:gd name="connsiteX9" fmla="*/ 6869 w 971991"/>
+                  <a:gd name="connsiteY9" fmla="*/ 40870 h 275075"/>
+                </a:gdLst>
+                <a:ahLst/>
+                <a:cxnLst>
+                  <a:cxn ang="0">
+                    <a:pos x="connsiteX0" y="connsiteY0"/>
+                  </a:cxn>
+                  <a:cxn ang="0">
+                    <a:pos x="connsiteX1" y="connsiteY1"/>
+                  </a:cxn>
+                  <a:cxn ang="0">
+                    <a:pos x="connsiteX2" y="connsiteY2"/>
+                  </a:cxn>
+                  <a:cxn ang="0">
+                    <a:pos x="connsiteX3" y="connsiteY3"/>
+                  </a:cxn>
+                  <a:cxn ang="0">
+                    <a:pos x="connsiteX4" y="connsiteY4"/>
+                  </a:cxn>
+                  <a:cxn ang="0">
+                    <a:pos x="connsiteX5" y="connsiteY5"/>
+                  </a:cxn>
+                  <a:cxn ang="0">
+                    <a:pos x="connsiteX6" y="connsiteY6"/>
+                  </a:cxn>
+                  <a:cxn ang="0">
+                    <a:pos x="connsiteX7" y="connsiteY7"/>
+                  </a:cxn>
+                  <a:cxn ang="0">
+                    <a:pos x="connsiteX8" y="connsiteY8"/>
+                  </a:cxn>
+                  <a:cxn ang="0">
+                    <a:pos x="connsiteX9" y="connsiteY9"/>
+                  </a:cxn>
+                </a:cxnLst>
+                <a:rect l="l" t="t" r="r" b="b"/>
+                <a:pathLst>
+                  <a:path w="971991" h="275075">
+                    <a:moveTo>
+                      <a:pt x="0" y="0"/>
+                    </a:moveTo>
+                    <a:lnTo>
+                      <a:pt x="136099" y="0"/>
+                    </a:lnTo>
+                    <a:lnTo>
+                      <a:pt x="139195" y="13789"/>
+                    </a:lnTo>
+                    <a:cubicBezTo>
+                      <a:pt x="172204" y="86219"/>
+                      <a:pt x="314929" y="140704"/>
+                      <a:pt x="485995" y="140704"/>
+                    </a:cubicBezTo>
+                    <a:cubicBezTo>
+                      <a:pt x="657061" y="140704"/>
+                      <a:pt x="799787" y="86219"/>
+                      <a:pt x="832795" y="13789"/>
+                    </a:cubicBezTo>
+                    <a:lnTo>
+                      <a:pt x="835891" y="0"/>
+                    </a:lnTo>
+                    <a:lnTo>
+                      <a:pt x="971991" y="0"/>
+                    </a:lnTo>
+                    <a:lnTo>
+                      <a:pt x="965121" y="40870"/>
+                    </a:lnTo>
+                    <a:cubicBezTo>
+                      <a:pt x="919518" y="174531"/>
+                      <a:pt x="722334" y="275075"/>
+                      <a:pt x="485995" y="275075"/>
+                    </a:cubicBezTo>
+                    <a:cubicBezTo>
+                      <a:pt x="249657" y="275075"/>
+                      <a:pt x="52473" y="174531"/>
+                      <a:pt x="6869" y="40870"/>
+                    </a:cubicBezTo>
+                    <a:close/>
+                  </a:path>
+                </a:pathLst>
+              </a:custGeom>
+              <a:solidFill>
+                <a:srgbClr val="76D6D2"/>
+              </a:solidFill>
+              <a:ln w="127000">
+                <a:noFill/>
+              </a:ln>
+              <a:effectLst/>
+            </p:spPr>
+            <p:style>
+              <a:lnRef idx="2">
+                <a:schemeClr val="accent1">
+                  <a:shade val="50000"/>
+                </a:schemeClr>
+              </a:lnRef>
+              <a:fillRef idx="1">
+                <a:schemeClr val="accent1"/>
+              </a:fillRef>
+              <a:effectRef idx="0">
+                <a:schemeClr val="accent1"/>
+              </a:effectRef>
+              <a:fontRef idx="minor">
+                <a:schemeClr val="lt1"/>
+              </a:fontRef>
+            </p:style>
+            <p:txBody>
+              <a:bodyPr wrap="square" rtlCol="0" anchor="ctr">
+                <a:noAutofit/>
+              </a:bodyPr>
+              <a:lstStyle/>
+              <a:p>
+                <a:pPr algn="ctr"/>
+                <a:endParaRPr lang="en-US"/>
+              </a:p>
+            </p:txBody>
+          </p:sp>
+          <p:sp>
+            <p:nvSpPr>
+              <p:cNvPr id="14" name="Freeform 13"/>
+              <p:cNvSpPr/>
+              <p:nvPr/>
+            </p:nvSpPr>
+            <p:spPr>
+              <a:xfrm rot="3600000">
+                <a:off x="5828061" y="2709145"/>
+                <a:ext cx="1802029" cy="1564371"/>
+              </a:xfrm>
+              <a:custGeom>
+                <a:avLst/>
+                <a:gdLst>
+                  <a:gd name="connsiteX0" fmla="*/ 767584 w 1802029"/>
+                  <a:gd name="connsiteY0" fmla="*/ 963405 h 1564371"/>
+                  <a:gd name="connsiteX1" fmla="*/ 902068 w 1802029"/>
+                  <a:gd name="connsiteY1" fmla="*/ 1196339 h 1564371"/>
+                  <a:gd name="connsiteX2" fmla="*/ 1036553 w 1802029"/>
+                  <a:gd name="connsiteY2" fmla="*/ 963405 h 1564371"/>
+                  <a:gd name="connsiteX3" fmla="*/ 899426 w 1802029"/>
+                  <a:gd name="connsiteY3" fmla="*/ 0 h 1564371"/>
+                  <a:gd name="connsiteX4" fmla="*/ 1090728 w 1802029"/>
+                  <a:gd name="connsiteY4" fmla="*/ 933178 h 1564371"/>
+                  <a:gd name="connsiteX5" fmla="*/ 1802029 w 1802029"/>
+                  <a:gd name="connsiteY5" fmla="*/ 1564371 h 1564371"/>
+                  <a:gd name="connsiteX6" fmla="*/ 895531 w 1802029"/>
+                  <a:gd name="connsiteY6" fmla="*/ 1262558 h 1564371"/>
+                  <a:gd name="connsiteX7" fmla="*/ 0 w 1802029"/>
+                  <a:gd name="connsiteY7" fmla="*/ 1560720 h 1564371"/>
+                  <a:gd name="connsiteX8" fmla="*/ 708333 w 1802029"/>
+                  <a:gd name="connsiteY8" fmla="*/ 932161 h 1564371"/>
+                </a:gdLst>
+                <a:ahLst/>
+                <a:cxnLst>
+                  <a:cxn ang="0">
+                    <a:pos x="connsiteX0" y="connsiteY0"/>
+                  </a:cxn>
+                  <a:cxn ang="0">
+                    <a:pos x="connsiteX1" y="connsiteY1"/>
+                  </a:cxn>
+                  <a:cxn ang="0">
+                    <a:pos x="connsiteX2" y="connsiteY2"/>
+                  </a:cxn>
+                  <a:cxn ang="0">
+                    <a:pos x="connsiteX3" y="connsiteY3"/>
+                  </a:cxn>
+                  <a:cxn ang="0">
+                    <a:pos x="connsiteX4" y="connsiteY4"/>
+                  </a:cxn>
+                  <a:cxn ang="0">
+                    <a:pos x="connsiteX5" y="connsiteY5"/>
+                  </a:cxn>
+                  <a:cxn ang="0">
+                    <a:pos x="connsiteX6" y="connsiteY6"/>
+                  </a:cxn>
+                  <a:cxn ang="0">
+                    <a:pos x="connsiteX7" y="connsiteY7"/>
+                  </a:cxn>
+                  <a:cxn ang="0">
+                    <a:pos x="connsiteX8" y="connsiteY8"/>
+                  </a:cxn>
+                </a:cxnLst>
+                <a:rect l="l" t="t" r="r" b="b"/>
+                <a:pathLst>
+                  <a:path w="1802029" h="1564371">
+                    <a:moveTo>
+                      <a:pt x="767584" y="963405"/>
+                    </a:moveTo>
+                    <a:lnTo>
+                      <a:pt x="902068" y="1196339"/>
+                    </a:lnTo>
+                    <a:lnTo>
+                      <a:pt x="1036553" y="963405"/>
+                    </a:lnTo>
+                    <a:close/>
+                    <a:moveTo>
+                      <a:pt x="899426" y="0"/>
+                    </a:moveTo>
+                    <a:lnTo>
+                      <a:pt x="1090728" y="933178"/>
+                    </a:lnTo>
+                    <a:lnTo>
+                      <a:pt x="1802029" y="1564371"/>
+                    </a:lnTo>
+                    <a:lnTo>
+                      <a:pt x="895531" y="1262558"/>
+                    </a:lnTo>
+                    <a:lnTo>
+                      <a:pt x="0" y="1560720"/>
+                    </a:lnTo>
+                    <a:lnTo>
+                      <a:pt x="708333" y="932161"/>
+                    </a:lnTo>
+                    <a:close/>
+                  </a:path>
+                </a:pathLst>
+              </a:custGeom>
+              <a:solidFill>
+                <a:schemeClr val="tx1"/>
+              </a:solidFill>
+              <a:ln>
+                <a:noFill/>
+              </a:ln>
+              <a:effectLst>
+                <a:softEdge rad="0"/>
+              </a:effectLst>
+            </p:spPr>
+            <p:style>
+              <a:lnRef idx="2">
+                <a:schemeClr val="accent1">
+                  <a:shade val="50000"/>
+                </a:schemeClr>
+              </a:lnRef>
+              <a:fillRef idx="1">
+                <a:schemeClr val="accent1"/>
+              </a:fillRef>
+              <a:effectRef idx="0">
+                <a:schemeClr val="accent1"/>
+              </a:effectRef>
+              <a:fontRef idx="minor">
+                <a:schemeClr val="lt1"/>
+              </a:fontRef>
+            </p:style>
+            <p:txBody>
+              <a:bodyPr wrap="square" rtlCol="0" anchor="ctr">
+                <a:noAutofit/>
+              </a:bodyPr>
+              <a:lstStyle/>
+              <a:p>
+                <a:pPr algn="ctr"/>
+                <a:endParaRPr lang="en-US"/>
+              </a:p>
+            </p:txBody>
+          </p:sp>
+          <p:sp>
+            <p:nvSpPr>
+              <p:cNvPr id="15" name="Freeform 14"/>
+              <p:cNvSpPr/>
+              <p:nvPr/>
+            </p:nvSpPr>
+            <p:spPr>
+              <a:xfrm rot="10800000">
+                <a:off x="6018203" y="3353643"/>
+                <a:ext cx="971991" cy="275075"/>
+              </a:xfrm>
+              <a:custGeom>
+                <a:avLst/>
+                <a:gdLst>
+                  <a:gd name="connsiteX0" fmla="*/ 0 w 971991"/>
+                  <a:gd name="connsiteY0" fmla="*/ 0 h 275075"/>
+                  <a:gd name="connsiteX1" fmla="*/ 136099 w 971991"/>
+                  <a:gd name="connsiteY1" fmla="*/ 0 h 275075"/>
+                  <a:gd name="connsiteX2" fmla="*/ 139195 w 971991"/>
+                  <a:gd name="connsiteY2" fmla="*/ 13789 h 275075"/>
+                  <a:gd name="connsiteX3" fmla="*/ 485995 w 971991"/>
+                  <a:gd name="connsiteY3" fmla="*/ 140704 h 275075"/>
+                  <a:gd name="connsiteX4" fmla="*/ 832795 w 971991"/>
+                  <a:gd name="connsiteY4" fmla="*/ 13789 h 275075"/>
+                  <a:gd name="connsiteX5" fmla="*/ 835891 w 971991"/>
+                  <a:gd name="connsiteY5" fmla="*/ 0 h 275075"/>
+                  <a:gd name="connsiteX6" fmla="*/ 971991 w 971991"/>
+                  <a:gd name="connsiteY6" fmla="*/ 0 h 275075"/>
+                  <a:gd name="connsiteX7" fmla="*/ 965121 w 971991"/>
+                  <a:gd name="connsiteY7" fmla="*/ 40870 h 275075"/>
+                  <a:gd name="connsiteX8" fmla="*/ 485995 w 971991"/>
+                  <a:gd name="connsiteY8" fmla="*/ 275075 h 275075"/>
+                  <a:gd name="connsiteX9" fmla="*/ 6869 w 971991"/>
+                  <a:gd name="connsiteY9" fmla="*/ 40870 h 275075"/>
+                </a:gdLst>
+                <a:ahLst/>
+                <a:cxnLst>
+                  <a:cxn ang="0">
+                    <a:pos x="connsiteX0" y="connsiteY0"/>
+                  </a:cxn>
+                  <a:cxn ang="0">
+                    <a:pos x="connsiteX1" y="connsiteY1"/>
+                  </a:cxn>
+                  <a:cxn ang="0">
+                    <a:pos x="connsiteX2" y="connsiteY2"/>
+                  </a:cxn>
+                  <a:cxn ang="0">
+                    <a:pos x="connsiteX3" y="connsiteY3"/>
+                  </a:cxn>
+                  <a:cxn ang="0">
+                    <a:pos x="connsiteX4" y="connsiteY4"/>
+                  </a:cxn>
+                  <a:cxn ang="0">
+                    <a:pos x="connsiteX5" y="connsiteY5"/>
+                  </a:cxn>
+                  <a:cxn ang="0">
+                    <a:pos x="connsiteX6" y="connsiteY6"/>
+                  </a:cxn>
+                  <a:cxn ang="0">
+                    <a:pos x="connsiteX7" y="connsiteY7"/>
+                  </a:cxn>
+                  <a:cxn ang="0">
+                    <a:pos x="connsiteX8" y="connsiteY8"/>
+                  </a:cxn>
+                  <a:cxn ang="0">
+                    <a:pos x="connsiteX9" y="connsiteY9"/>
+                  </a:cxn>
+                </a:cxnLst>
+                <a:rect l="l" t="t" r="r" b="b"/>
+                <a:pathLst>
+                  <a:path w="971991" h="275075">
+                    <a:moveTo>
+                      <a:pt x="0" y="0"/>
+                    </a:moveTo>
+                    <a:lnTo>
+                      <a:pt x="136099" y="0"/>
+                    </a:lnTo>
+                    <a:lnTo>
+                      <a:pt x="139195" y="13789"/>
+                    </a:lnTo>
+                    <a:cubicBezTo>
+                      <a:pt x="172204" y="86219"/>
+                      <a:pt x="314929" y="140704"/>
+                      <a:pt x="485995" y="140704"/>
+                    </a:cubicBezTo>
+                    <a:cubicBezTo>
+                      <a:pt x="657061" y="140704"/>
+                      <a:pt x="799787" y="86219"/>
+                      <a:pt x="832795" y="13789"/>
+                    </a:cubicBezTo>
+                    <a:lnTo>
+                      <a:pt x="835891" y="0"/>
+                    </a:lnTo>
+                    <a:lnTo>
+                      <a:pt x="971991" y="0"/>
+                    </a:lnTo>
+                    <a:lnTo>
+                      <a:pt x="965121" y="40870"/>
+                    </a:lnTo>
+                    <a:cubicBezTo>
+                      <a:pt x="919518" y="174531"/>
+                      <a:pt x="722334" y="275075"/>
+                      <a:pt x="485995" y="275075"/>
+                    </a:cubicBezTo>
+                    <a:cubicBezTo>
+                      <a:pt x="249657" y="275075"/>
+                      <a:pt x="52473" y="174531"/>
+                      <a:pt x="6869" y="40870"/>
+                    </a:cubicBezTo>
+                    <a:close/>
+                  </a:path>
+                </a:pathLst>
+              </a:custGeom>
+              <a:solidFill>
+                <a:srgbClr val="76D6D2"/>
+              </a:solidFill>
+              <a:ln w="127000">
+                <a:noFill/>
+              </a:ln>
+              <a:effectLst/>
+            </p:spPr>
+            <p:style>
+              <a:lnRef idx="2">
+                <a:schemeClr val="accent1">
+                  <a:shade val="50000"/>
+                </a:schemeClr>
+              </a:lnRef>
+              <a:fillRef idx="1">
+                <a:schemeClr val="accent1"/>
+              </a:fillRef>
+              <a:effectRef idx="0">
+                <a:schemeClr val="accent1"/>
+              </a:effectRef>
+              <a:fontRef idx="minor">
+                <a:schemeClr val="lt1"/>
+              </a:fontRef>
+            </p:style>
+            <p:txBody>
+              <a:bodyPr wrap="square" rtlCol="0" anchor="ctr">
+                <a:noAutofit/>
+              </a:bodyPr>
+              <a:lstStyle/>
+              <a:p>
+                <a:pPr algn="ctr"/>
+                <a:endParaRPr lang="en-US"/>
+              </a:p>
+            </p:txBody>
+          </p:sp>
+        </p:grpSp>
+        <p:sp>
+          <p:nvSpPr>
+            <p:cNvPr id="16" name="TextBox 15"/>
+            <p:cNvSpPr txBox="1"/>
+            <p:nvPr/>
+          </p:nvSpPr>
+          <p:spPr>
+            <a:xfrm>
+              <a:off x="2897497" y="3621933"/>
+              <a:ext cx="6473860" cy="2092881"/>
+            </a:xfrm>
+            <a:prstGeom prst="rect">
+              <a:avLst/>
+            </a:prstGeom>
+            <a:noFill/>
+          </p:spPr>
+          <p:txBody>
+            <a:bodyPr wrap="square" rtlCol="0">
+              <a:spAutoFit/>
+            </a:bodyPr>
+            <a:lstStyle/>
+            <a:p>
+              <a:r>
+                <a:rPr lang="en-US" sz="13000" b="1" dirty="0" smtClean="0">
+                  <a:solidFill>
+                    <a:schemeClr val="bg1"/>
+                  </a:solidFill>
+                  <a:latin typeface="Futura Medium" charset="0"/>
+                  <a:ea typeface="Futura Medium" charset="0"/>
+                  <a:cs typeface="Futura Medium" charset="0"/>
+                </a:rPr>
+                <a:t>Enpact</a:t>
+              </a:r>
+              <a:endParaRPr lang="en-US" sz="13000" b="1" dirty="0">
+                <a:solidFill>
+                  <a:schemeClr val="bg1"/>
+                </a:solidFill>
+                <a:latin typeface="Futura Medium" charset="0"/>
+                <a:ea typeface="Futura Medium" charset="0"/>
+                <a:cs typeface="Futura Medium" charset="0"/>
+              </a:endParaRPr>
+            </a:p>
+          </p:txBody>
+        </p:sp>
+      </p:grpSp>
+      <p:sp>
+        <p:nvSpPr>
+          <p:cNvPr id="19" name="Rounded Rectangle 18"/>
+          <p:cNvSpPr/>
+          <p:nvPr/>
+        </p:nvSpPr>
+        <p:spPr>
+          <a:xfrm>
+            <a:off x="238539" y="3462187"/>
+            <a:ext cx="9144000" cy="3269210"/>
+          </a:xfrm>
+          <a:prstGeom prst="roundRect">
+            <a:avLst/>
+          </a:prstGeom>
+          <a:solidFill>
+            <a:schemeClr val="tx1"/>
+          </a:solidFill>
+          <a:effectLst>
+            <a:outerShdw blurRad="63500" sx="102000" sy="102000" algn="ctr" rotWithShape="0">
+              <a:prstClr val="black">
+                <a:alpha val="40000"/>
+              </a:prstClr>
+            </a:outerShdw>
+          </a:effectLst>
+        </p:spPr>
+        <p:style>
+          <a:lnRef idx="2">
+            <a:schemeClr val="accent1">
+              <a:shade val="50000"/>
+            </a:schemeClr>
+          </a:lnRef>
+          <a:fillRef idx="1">
+            <a:schemeClr val="accent1"/>
+          </a:fillRef>
+          <a:effectRef idx="0">
+            <a:schemeClr val="accent1"/>
+          </a:effectRef>
+          <a:fontRef idx="minor">
+            <a:schemeClr val="lt1"/>
+          </a:fontRef>
+        </p:style>
+        <p:txBody>
+          <a:bodyPr rtlCol="0" anchor="ctr"/>
+          <a:lstStyle/>
+          <a:p>
+            <a:pPr algn="ctr"/>
+            <a:endParaRPr lang="en-US"/>
+          </a:p>
+        </p:txBody>
+      </p:sp>
+      <p:grpSp>
+        <p:nvGrpSpPr>
+          <p:cNvPr id="3" name="Group 2"/>
+          <p:cNvGrpSpPr/>
+          <p:nvPr/>
+        </p:nvGrpSpPr>
+        <p:grpSpPr>
+          <a:xfrm>
+            <a:off x="923579" y="4034002"/>
+            <a:ext cx="8127656" cy="2092881"/>
+            <a:chOff x="1162118" y="3949781"/>
+            <a:chExt cx="8127656" cy="2092881"/>
+          </a:xfrm>
+        </p:grpSpPr>
+        <p:sp>
+          <p:nvSpPr>
+            <p:cNvPr id="20" name="TextBox 19"/>
+            <p:cNvSpPr txBox="1"/>
+            <p:nvPr/>
+          </p:nvSpPr>
+          <p:spPr>
+            <a:xfrm>
+              <a:off x="3276225" y="3949781"/>
+              <a:ext cx="6013549" cy="2092881"/>
+            </a:xfrm>
+            <a:prstGeom prst="rect">
+              <a:avLst/>
+            </a:prstGeom>
+            <a:noFill/>
+          </p:spPr>
+          <p:txBody>
+            <a:bodyPr wrap="square" rtlCol="0">
+              <a:spAutoFit/>
+            </a:bodyPr>
+            <a:lstStyle/>
+            <a:p>
+              <a:r>
+                <a:rPr lang="en-US" sz="13000" b="1" dirty="0" smtClean="0">
+                  <a:solidFill>
+                    <a:schemeClr val="bg1"/>
+                  </a:solidFill>
+                  <a:latin typeface="Futura Medium" charset="0"/>
+                  <a:ea typeface="Futura Medium" charset="0"/>
+                  <a:cs typeface="Futura Medium" charset="0"/>
+                </a:rPr>
+                <a:t>Enpact</a:t>
+              </a:r>
+              <a:endParaRPr lang="en-US" sz="13000" b="1" dirty="0">
+                <a:solidFill>
+                  <a:schemeClr val="bg1"/>
+                </a:solidFill>
+                <a:latin typeface="Futura Medium" charset="0"/>
+                <a:ea typeface="Futura Medium" charset="0"/>
+                <a:cs typeface="Futura Medium" charset="0"/>
+              </a:endParaRPr>
+            </a:p>
+          </p:txBody>
+        </p:sp>
+        <p:grpSp>
+          <p:nvGrpSpPr>
+            <p:cNvPr id="2" name="Group 1"/>
+            <p:cNvGrpSpPr/>
+            <p:nvPr/>
+          </p:nvGrpSpPr>
+          <p:grpSpPr>
+            <a:xfrm>
+              <a:off x="1162118" y="4115868"/>
+              <a:ext cx="2042419" cy="1760706"/>
+              <a:chOff x="4841522" y="2676981"/>
+              <a:chExt cx="2042419" cy="1760706"/>
+            </a:xfrm>
+          </p:grpSpPr>
+          <p:sp>
+            <p:nvSpPr>
+              <p:cNvPr id="21" name="Triangle 20"/>
+              <p:cNvSpPr/>
+              <p:nvPr/>
+            </p:nvSpPr>
+            <p:spPr>
+              <a:xfrm rot="10800000">
+                <a:off x="4841522" y="2676981"/>
+                <a:ext cx="2042419" cy="1760706"/>
+              </a:xfrm>
+              <a:prstGeom prst="triangle">
+                <a:avLst/>
+              </a:prstGeom>
+              <a:solidFill>
+                <a:schemeClr val="bg1"/>
+              </a:solidFill>
+              <a:ln>
+                <a:solidFill>
+                  <a:schemeClr val="bg1"/>
+                </a:solidFill>
+              </a:ln>
+            </p:spPr>
+            <p:style>
+              <a:lnRef idx="2">
+                <a:schemeClr val="accent1">
+                  <a:shade val="50000"/>
+                </a:schemeClr>
+              </a:lnRef>
+              <a:fillRef idx="1">
+                <a:schemeClr val="accent1"/>
+              </a:fillRef>
+              <a:effectRef idx="0">
+                <a:schemeClr val="accent1"/>
+              </a:effectRef>
+              <a:fontRef idx="minor">
+                <a:schemeClr val="lt1"/>
+              </a:fontRef>
+            </p:style>
+            <p:txBody>
+              <a:bodyPr rtlCol="0" anchor="ctr"/>
+              <a:lstStyle/>
+              <a:p>
+                <a:pPr algn="ctr"/>
+                <a:endParaRPr lang="en-US"/>
+              </a:p>
+            </p:txBody>
+          </p:sp>
+          <p:sp>
+            <p:nvSpPr>
+              <p:cNvPr id="22" name="Triangle 21"/>
+              <p:cNvSpPr/>
+              <p:nvPr/>
+            </p:nvSpPr>
+            <p:spPr>
+              <a:xfrm rot="3600000">
+                <a:off x="6157913" y="2513607"/>
+                <a:ext cx="394996" cy="963405"/>
+              </a:xfrm>
+              <a:prstGeom prst="triangle">
+                <a:avLst/>
+              </a:prstGeom>
+              <a:solidFill>
+                <a:schemeClr val="tx1"/>
+              </a:solidFill>
+              <a:ln>
+                <a:solidFill>
+                  <a:schemeClr val="tx1"/>
+                </a:solidFill>
+              </a:ln>
+            </p:spPr>
+            <p:style>
+              <a:lnRef idx="2">
+                <a:schemeClr val="accent1">
+                  <a:shade val="50000"/>
+                </a:schemeClr>
+              </a:lnRef>
+              <a:fillRef idx="1">
+                <a:schemeClr val="accent1"/>
+              </a:fillRef>
+              <a:effectRef idx="0">
+                <a:schemeClr val="accent1"/>
+              </a:effectRef>
+              <a:fontRef idx="minor">
+                <a:schemeClr val="lt1"/>
+              </a:fontRef>
+            </p:style>
+            <p:txBody>
+              <a:bodyPr rtlCol="0" anchor="ctr"/>
+              <a:lstStyle/>
+              <a:p>
+                <a:pPr algn="ctr"/>
+                <a:endParaRPr lang="en-US"/>
+              </a:p>
+            </p:txBody>
+          </p:sp>
+          <p:sp>
+            <p:nvSpPr>
+              <p:cNvPr id="23" name="Triangle 22"/>
+              <p:cNvSpPr/>
+              <p:nvPr/>
+            </p:nvSpPr>
+            <p:spPr>
+              <a:xfrm rot="18000000">
+                <a:off x="5190910" y="2515041"/>
+                <a:ext cx="394996" cy="963405"/>
+              </a:xfrm>
+              <a:prstGeom prst="triangle">
+                <a:avLst/>
+              </a:prstGeom>
+              <a:solidFill>
+                <a:schemeClr val="tx1"/>
+              </a:solidFill>
+              <a:ln>
+                <a:solidFill>
+                  <a:schemeClr val="tx1"/>
+                </a:solidFill>
+              </a:ln>
+            </p:spPr>
+            <p:style>
+              <a:lnRef idx="2">
+                <a:schemeClr val="accent1">
+                  <a:shade val="50000"/>
+                </a:schemeClr>
+              </a:lnRef>
+              <a:fillRef idx="1">
+                <a:schemeClr val="accent1"/>
+              </a:fillRef>
+              <a:effectRef idx="0">
+                <a:schemeClr val="accent1"/>
+              </a:effectRef>
+              <a:fontRef idx="minor">
+                <a:schemeClr val="lt1"/>
+              </a:fontRef>
+            </p:style>
+            <p:txBody>
+              <a:bodyPr rtlCol="0" anchor="ctr"/>
+              <a:lstStyle/>
+              <a:p>
+                <a:pPr algn="ctr"/>
+                <a:endParaRPr lang="en-US"/>
+              </a:p>
+            </p:txBody>
+          </p:sp>
+          <p:sp>
+            <p:nvSpPr>
+              <p:cNvPr id="24" name="Oval 23"/>
+              <p:cNvSpPr/>
+              <p:nvPr/>
+            </p:nvSpPr>
+            <p:spPr>
+              <a:xfrm>
+                <a:off x="5453698" y="3055666"/>
+                <a:ext cx="830786" cy="452907"/>
+              </a:xfrm>
+              <a:prstGeom prst="ellipse">
+                <a:avLst/>
+              </a:prstGeom>
+              <a:noFill/>
+              <a:ln w="127000">
+                <a:solidFill>
+                  <a:srgbClr val="76D6D2"/>
+                </a:solidFill>
+              </a:ln>
+              <a:effectLst/>
+            </p:spPr>
+            <p:style>
+              <a:lnRef idx="2">
+                <a:schemeClr val="accent1">
+                  <a:shade val="50000"/>
+                </a:schemeClr>
+              </a:lnRef>
+              <a:fillRef idx="1">
+                <a:schemeClr val="accent1"/>
+              </a:fillRef>
+              <a:effectRef idx="0">
+                <a:schemeClr val="accent1"/>
+              </a:effectRef>
+              <a:fontRef idx="minor">
+                <a:schemeClr val="lt1"/>
+              </a:fontRef>
+            </p:style>
+            <p:txBody>
+              <a:bodyPr rtlCol="0" anchor="ctr"/>
+              <a:lstStyle/>
+              <a:p>
+                <a:pPr algn="ctr"/>
+                <a:endParaRPr lang="en-US"/>
+              </a:p>
+            </p:txBody>
+          </p:sp>
+          <p:sp>
+            <p:nvSpPr>
+              <p:cNvPr id="25" name="Triangle 24"/>
+              <p:cNvSpPr/>
+              <p:nvPr/>
+            </p:nvSpPr>
+            <p:spPr>
+              <a:xfrm rot="10800000">
+                <a:off x="5671595" y="3354916"/>
+                <a:ext cx="394996" cy="963405"/>
+              </a:xfrm>
+              <a:prstGeom prst="triangle">
+                <a:avLst/>
+              </a:prstGeom>
+              <a:solidFill>
+                <a:schemeClr val="tx1"/>
+              </a:solidFill>
+              <a:ln>
+                <a:solidFill>
+                  <a:schemeClr val="tx1"/>
+                </a:solidFill>
+              </a:ln>
+            </p:spPr>
+            <p:style>
+              <a:lnRef idx="2">
+                <a:schemeClr val="accent1">
+                  <a:shade val="50000"/>
+                </a:schemeClr>
+              </a:lnRef>
+              <a:fillRef idx="1">
+                <a:schemeClr val="accent1"/>
+              </a:fillRef>
+              <a:effectRef idx="0">
+                <a:schemeClr val="accent1"/>
+              </a:effectRef>
+              <a:fontRef idx="minor">
+                <a:schemeClr val="lt1"/>
+              </a:fontRef>
+            </p:style>
+            <p:txBody>
+              <a:bodyPr rtlCol="0" anchor="ctr"/>
+              <a:lstStyle/>
+              <a:p>
+                <a:pPr algn="ctr"/>
+                <a:endParaRPr lang="en-US"/>
+              </a:p>
+            </p:txBody>
+          </p:sp>
+        </p:grpSp>
+      </p:grpSp>
+    </p:spTree>
+    <p:extLst>
+      <p:ext uri="{BB962C8B-B14F-4D97-AF65-F5344CB8AC3E}">
+        <p14:creationId xmlns:p14="http://schemas.microsoft.com/office/powerpoint/2010/main" val="1919402068"/>
+      </p:ext>
+    </p:extLst>
+  </p:cSld>
+  <p:clrMapOvr>
+    <a:masterClrMapping/>
+  </p:clrMapOvr>
+</p:sld>
+</file>
+
+<file path=ppt/slides/slide11.xml><?xml version="1.0" encoding="utf-8"?>
 <p:sld xmlns:a="http://schemas.openxmlformats.org/drawingml/2006/main" xmlns:r="http://schemas.openxmlformats.org/officeDocument/2006/relationships" xmlns:p="http://schemas.openxmlformats.org/presentationml/2006/main">
   <p:cSld>
     <p:spTree>
@@ -5930,13 +6935,15 @@
       <p:grpSp>
         <p:nvGrpSpPr>
           <p:cNvPr id="7" name="Group 6"/>
-          <p:cNvGrpSpPr/>
+          <p:cNvGrpSpPr>
+            <a:grpSpLocks/>
+          </p:cNvGrpSpPr>
           <p:nvPr/>
         </p:nvGrpSpPr>
         <p:grpSpPr>
           <a:xfrm>
             <a:off x="1219200" y="2849563"/>
-            <a:ext cx="6802582" cy="2581419"/>
+            <a:ext cx="6802582" cy="2721600"/>
             <a:chOff x="1219200" y="2849563"/>
             <a:chExt cx="6802582" cy="2581419"/>
           </a:xfrm>
@@ -6019,8 +7026,8 @@
           </p:nvSpPr>
           <p:spPr>
             <a:xfrm>
-              <a:off x="5902035" y="3449072"/>
-              <a:ext cx="1382400" cy="1382400"/>
+              <a:off x="5902035" y="3484674"/>
+              <a:ext cx="1382400" cy="1311197"/>
             </a:xfrm>
             <a:prstGeom prst="rect">
               <a:avLst/>
@@ -6167,8 +7174,8 @@
         </p:nvGrpSpPr>
         <p:grpSpPr>
           <a:xfrm>
-            <a:off x="512618" y="2849563"/>
-            <a:ext cx="8002732" cy="2581419"/>
+            <a:off x="512618" y="2849562"/>
+            <a:ext cx="8002732" cy="3200400"/>
             <a:chOff x="512618" y="2849563"/>
             <a:chExt cx="8002732" cy="2581419"/>
           </a:xfrm>
@@ -6251,8 +7258,8 @@
           </p:nvSpPr>
           <p:spPr>
             <a:xfrm>
-              <a:off x="6395603" y="3449072"/>
-              <a:ext cx="1382400" cy="1382400"/>
+              <a:off x="6437167" y="3582756"/>
+              <a:ext cx="1382400" cy="1115034"/>
             </a:xfrm>
             <a:custGeom>
               <a:avLst/>
@@ -6398,6 +7405,299 @@
       </p:grpSpPr>
       <p:sp>
         <p:nvSpPr>
+          <p:cNvPr id="5" name="Rectangle 4"/>
+          <p:cNvSpPr/>
+          <p:nvPr/>
+        </p:nvSpPr>
+        <p:spPr>
+          <a:xfrm>
+            <a:off x="116325" y="1524000"/>
+            <a:ext cx="8911349" cy="4983669"/>
+          </a:xfrm>
+          <a:prstGeom prst="rect">
+            <a:avLst/>
+          </a:prstGeom>
+          <a:solidFill>
+            <a:schemeClr val="tx1"/>
+          </a:solidFill>
+          <a:ln>
+            <a:solidFill>
+              <a:schemeClr val="bg1"/>
+            </a:solidFill>
+          </a:ln>
+        </p:spPr>
+        <p:style>
+          <a:lnRef idx="2">
+            <a:schemeClr val="accent1">
+              <a:shade val="50000"/>
+            </a:schemeClr>
+          </a:lnRef>
+          <a:fillRef idx="1">
+            <a:schemeClr val="accent1"/>
+          </a:fillRef>
+          <a:effectRef idx="0">
+            <a:schemeClr val="accent1"/>
+          </a:effectRef>
+          <a:fontRef idx="minor">
+            <a:schemeClr val="lt1"/>
+          </a:fontRef>
+        </p:style>
+        <p:txBody>
+          <a:bodyPr rtlCol="0" anchor="ctr"/>
+          <a:lstStyle/>
+          <a:p>
+            <a:pPr algn="ctr"/>
+            <a:endParaRPr lang="en-US"/>
+          </a:p>
+        </p:txBody>
+      </p:sp>
+      <p:sp>
+        <p:nvSpPr>
+          <p:cNvPr id="2" name="Title 1"/>
+          <p:cNvSpPr>
+            <a:spLocks noGrp="1"/>
+          </p:cNvSpPr>
+          <p:nvPr>
+            <p:ph type="title"/>
+          </p:nvPr>
+        </p:nvSpPr>
+        <p:spPr/>
+        <p:txBody>
+          <a:bodyPr/>
+          <a:lstStyle/>
+          <a:p>
+            <a:r>
+              <a:rPr lang="en-US" dirty="0" smtClean="0"/>
+              <a:t>Pause Button</a:t>
+            </a:r>
+            <a:endParaRPr lang="en-US" dirty="0"/>
+          </a:p>
+        </p:txBody>
+      </p:sp>
+      <p:grpSp>
+        <p:nvGrpSpPr>
+          <p:cNvPr id="3" name="Group 2"/>
+          <p:cNvGrpSpPr/>
+          <p:nvPr/>
+        </p:nvGrpSpPr>
+        <p:grpSpPr>
+          <a:xfrm>
+            <a:off x="116324" y="2461634"/>
+            <a:ext cx="8911349" cy="3567600"/>
+            <a:chOff x="116325" y="2849563"/>
+            <a:chExt cx="8911349" cy="2581419"/>
+          </a:xfrm>
+        </p:grpSpPr>
+        <p:sp>
+          <p:nvSpPr>
+            <p:cNvPr id="6" name="Rounded Rectangle 5"/>
+            <p:cNvSpPr/>
+            <p:nvPr/>
+          </p:nvSpPr>
+          <p:spPr>
+            <a:xfrm>
+              <a:off x="116325" y="2849563"/>
+              <a:ext cx="8911349" cy="2581419"/>
+            </a:xfrm>
+            <a:prstGeom prst="roundRect">
+              <a:avLst/>
+            </a:prstGeom>
+            <a:solidFill>
+              <a:schemeClr val="bg1">
+                <a:lumMod val="50000"/>
+              </a:schemeClr>
+            </a:solidFill>
+            <a:ln>
+              <a:solidFill>
+                <a:schemeClr val="bg1"/>
+              </a:solidFill>
+            </a:ln>
+            <a:effectLst>
+              <a:innerShdw blurRad="63500" dist="101600" dir="5400000">
+                <a:prstClr val="black">
+                  <a:alpha val="83000"/>
+                </a:prstClr>
+              </a:innerShdw>
+            </a:effectLst>
+          </p:spPr>
+          <p:style>
+            <a:lnRef idx="2">
+              <a:schemeClr val="accent1">
+                <a:shade val="50000"/>
+              </a:schemeClr>
+            </a:lnRef>
+            <a:fillRef idx="1">
+              <a:schemeClr val="accent1"/>
+            </a:fillRef>
+            <a:effectRef idx="0">
+              <a:schemeClr val="accent1"/>
+            </a:effectRef>
+            <a:fontRef idx="minor">
+              <a:schemeClr val="lt1"/>
+            </a:fontRef>
+          </p:style>
+          <p:txBody>
+            <a:bodyPr rtlCol="0" anchor="ctr"/>
+            <a:lstStyle/>
+            <a:p>
+              <a:r>
+                <a:rPr lang="en-US" sz="14000" dirty="0" smtClean="0">
+                  <a:latin typeface="Helvetica Neue" charset="0"/>
+                  <a:ea typeface="Helvetica Neue" charset="0"/>
+                  <a:cs typeface="Helvetica Neue" charset="0"/>
+                </a:rPr>
+                <a:t>Resume</a:t>
+              </a:r>
+              <a:endParaRPr lang="en-US" sz="14000" dirty="0">
+                <a:latin typeface="Helvetica Neue" charset="0"/>
+                <a:ea typeface="Helvetica Neue" charset="0"/>
+                <a:cs typeface="Helvetica Neue" charset="0"/>
+              </a:endParaRPr>
+            </a:p>
+          </p:txBody>
+        </p:sp>
+        <p:sp>
+          <p:nvSpPr>
+            <p:cNvPr id="7" name="Freeform 6"/>
+            <p:cNvSpPr/>
+            <p:nvPr/>
+          </p:nvSpPr>
+          <p:spPr>
+            <a:xfrm rot="8100000">
+              <a:off x="6978707" y="3640138"/>
+              <a:ext cx="1382400" cy="1000267"/>
+            </a:xfrm>
+            <a:custGeom>
+              <a:avLst/>
+              <a:gdLst>
+                <a:gd name="connsiteX0" fmla="*/ 379693 w 1384464"/>
+                <a:gd name="connsiteY0" fmla="*/ 1384948 h 1384948"/>
+                <a:gd name="connsiteX1" fmla="*/ 0 w 1384464"/>
+                <a:gd name="connsiteY1" fmla="*/ 1384948 h 1384948"/>
+                <a:gd name="connsiteX2" fmla="*/ 0 w 1384464"/>
+                <a:gd name="connsiteY2" fmla="*/ 0 h 1384948"/>
+                <a:gd name="connsiteX3" fmla="*/ 1384464 w 1384464"/>
+                <a:gd name="connsiteY3" fmla="*/ 0 h 1384948"/>
+                <a:gd name="connsiteX4" fmla="*/ 1384464 w 1384464"/>
+                <a:gd name="connsiteY4" fmla="*/ 342907 h 1384948"/>
+                <a:gd name="connsiteX5" fmla="*/ 379693 w 1384464"/>
+                <a:gd name="connsiteY5" fmla="*/ 342907 h 1384948"/>
+              </a:gdLst>
+              <a:ahLst/>
+              <a:cxnLst>
+                <a:cxn ang="0">
+                  <a:pos x="connsiteX0" y="connsiteY0"/>
+                </a:cxn>
+                <a:cxn ang="0">
+                  <a:pos x="connsiteX1" y="connsiteY1"/>
+                </a:cxn>
+                <a:cxn ang="0">
+                  <a:pos x="connsiteX2" y="connsiteY2"/>
+                </a:cxn>
+                <a:cxn ang="0">
+                  <a:pos x="connsiteX3" y="connsiteY3"/>
+                </a:cxn>
+                <a:cxn ang="0">
+                  <a:pos x="connsiteX4" y="connsiteY4"/>
+                </a:cxn>
+                <a:cxn ang="0">
+                  <a:pos x="connsiteX5" y="connsiteY5"/>
+                </a:cxn>
+              </a:cxnLst>
+              <a:rect l="l" t="t" r="r" b="b"/>
+              <a:pathLst>
+                <a:path w="1384464" h="1384948">
+                  <a:moveTo>
+                    <a:pt x="379693" y="1384948"/>
+                  </a:moveTo>
+                  <a:lnTo>
+                    <a:pt x="0" y="1384948"/>
+                  </a:lnTo>
+                  <a:lnTo>
+                    <a:pt x="0" y="0"/>
+                  </a:lnTo>
+                  <a:lnTo>
+                    <a:pt x="1384464" y="0"/>
+                  </a:lnTo>
+                  <a:lnTo>
+                    <a:pt x="1384464" y="342907"/>
+                  </a:lnTo>
+                  <a:lnTo>
+                    <a:pt x="379693" y="342907"/>
+                  </a:lnTo>
+                  <a:close/>
+                </a:path>
+              </a:pathLst>
+            </a:custGeom>
+            <a:solidFill>
+              <a:schemeClr val="bg1"/>
+            </a:solidFill>
+            <a:ln>
+              <a:noFill/>
+            </a:ln>
+          </p:spPr>
+          <p:style>
+            <a:lnRef idx="2">
+              <a:schemeClr val="accent1">
+                <a:shade val="50000"/>
+              </a:schemeClr>
+            </a:lnRef>
+            <a:fillRef idx="1">
+              <a:schemeClr val="accent1"/>
+            </a:fillRef>
+            <a:effectRef idx="0">
+              <a:schemeClr val="accent1"/>
+            </a:effectRef>
+            <a:fontRef idx="minor">
+              <a:schemeClr val="lt1"/>
+            </a:fontRef>
+          </p:style>
+          <p:txBody>
+            <a:bodyPr rtlCol="0" anchor="ctr"/>
+            <a:lstStyle/>
+            <a:p>
+              <a:pPr algn="ctr"/>
+              <a:endParaRPr lang="en-US">
+                <a:solidFill>
+                  <a:schemeClr val="tx1"/>
+                </a:solidFill>
+              </a:endParaRPr>
+            </a:p>
+          </p:txBody>
+        </p:sp>
+      </p:grpSp>
+    </p:spTree>
+    <p:extLst>
+      <p:ext uri="{BB962C8B-B14F-4D97-AF65-F5344CB8AC3E}">
+        <p14:creationId xmlns:p14="http://schemas.microsoft.com/office/powerpoint/2010/main" val="65109253"/>
+      </p:ext>
+    </p:extLst>
+  </p:cSld>
+  <p:clrMapOvr>
+    <a:masterClrMapping/>
+  </p:clrMapOvr>
+</p:sld>
+</file>
+
+<file path=ppt/slides/slide7.xml><?xml version="1.0" encoding="utf-8"?>
+<p:sld xmlns:a="http://schemas.openxmlformats.org/drawingml/2006/main" xmlns:r="http://schemas.openxmlformats.org/officeDocument/2006/relationships" xmlns:p="http://schemas.openxmlformats.org/presentationml/2006/main">
+  <p:cSld>
+    <p:spTree>
+      <p:nvGrpSpPr>
+        <p:cNvPr id="1" name=""/>
+        <p:cNvGrpSpPr/>
+        <p:nvPr/>
+      </p:nvGrpSpPr>
+      <p:grpSpPr>
+        <a:xfrm>
+          <a:off x="0" y="0"/>
+          <a:ext cx="0" cy="0"/>
+          <a:chOff x="0" y="0"/>
+          <a:chExt cx="0" cy="0"/>
+        </a:xfrm>
+      </p:grpSpPr>
+      <p:sp>
+        <p:nvSpPr>
           <p:cNvPr id="2" name="Title 1"/>
           <p:cNvSpPr>
             <a:spLocks noGrp="1"/>
@@ -6438,7 +7738,7 @@
 </p:sld>
 </file>
 
-<file path=ppt/slides/slide7.xml><?xml version="1.0" encoding="utf-8"?>
+<file path=ppt/slides/slide8.xml><?xml version="1.0" encoding="utf-8"?>
 <p:sld xmlns:a="http://schemas.openxmlformats.org/drawingml/2006/main" xmlns:r="http://schemas.openxmlformats.org/officeDocument/2006/relationships" xmlns:p="http://schemas.openxmlformats.org/presentationml/2006/main">
   <p:cSld>
     <p:spTree>
@@ -7079,7 +8379,7 @@
 </p:sld>
 </file>
 
-<file path=ppt/slides/slide8.xml><?xml version="1.0" encoding="utf-8"?>
+<file path=ppt/slides/slide9.xml><?xml version="1.0" encoding="utf-8"?>
 <p:sld xmlns:a="http://schemas.openxmlformats.org/drawingml/2006/main" xmlns:r="http://schemas.openxmlformats.org/officeDocument/2006/relationships" xmlns:p="http://schemas.openxmlformats.org/presentationml/2006/main">
   <p:cSld>
     <p:spTree>
@@ -9066,1010 +10366,6 @@
     <p:extLst>
       <p:ext uri="{BB962C8B-B14F-4D97-AF65-F5344CB8AC3E}">
         <p14:creationId xmlns:p14="http://schemas.microsoft.com/office/powerpoint/2010/main" val="730457403"/>
-      </p:ext>
-    </p:extLst>
-  </p:cSld>
-  <p:clrMapOvr>
-    <a:masterClrMapping/>
-  </p:clrMapOvr>
-</p:sld>
-</file>
-
-<file path=ppt/slides/slide9.xml><?xml version="1.0" encoding="utf-8"?>
-<p:sld xmlns:a="http://schemas.openxmlformats.org/drawingml/2006/main" xmlns:r="http://schemas.openxmlformats.org/officeDocument/2006/relationships" xmlns:p="http://schemas.openxmlformats.org/presentationml/2006/main">
-  <p:cSld>
-    <p:spTree>
-      <p:nvGrpSpPr>
-        <p:cNvPr id="1" name=""/>
-        <p:cNvGrpSpPr/>
-        <p:nvPr/>
-      </p:nvGrpSpPr>
-      <p:grpSpPr>
-        <a:xfrm>
-          <a:off x="0" y="0"/>
-          <a:ext cx="0" cy="0"/>
-          <a:chOff x="0" y="0"/>
-          <a:chExt cx="0" cy="0"/>
-        </a:xfrm>
-      </p:grpSpPr>
-      <p:sp>
-        <p:nvSpPr>
-          <p:cNvPr id="17" name="Rounded Rectangle 16"/>
-          <p:cNvSpPr/>
-          <p:nvPr/>
-        </p:nvSpPr>
-        <p:spPr>
-          <a:xfrm>
-            <a:off x="238539" y="114791"/>
-            <a:ext cx="9144000" cy="3269210"/>
-          </a:xfrm>
-          <a:prstGeom prst="roundRect">
-            <a:avLst/>
-          </a:prstGeom>
-          <a:solidFill>
-            <a:schemeClr val="tx1"/>
-          </a:solidFill>
-          <a:effectLst>
-            <a:outerShdw blurRad="63500" sx="102000" sy="102000" algn="ctr" rotWithShape="0">
-              <a:prstClr val="black">
-                <a:alpha val="40000"/>
-              </a:prstClr>
-            </a:outerShdw>
-          </a:effectLst>
-        </p:spPr>
-        <p:style>
-          <a:lnRef idx="2">
-            <a:schemeClr val="accent1">
-              <a:shade val="50000"/>
-            </a:schemeClr>
-          </a:lnRef>
-          <a:fillRef idx="1">
-            <a:schemeClr val="accent1"/>
-          </a:fillRef>
-          <a:effectRef idx="0">
-            <a:schemeClr val="accent1"/>
-          </a:effectRef>
-          <a:fontRef idx="minor">
-            <a:schemeClr val="lt1"/>
-          </a:fontRef>
-        </p:style>
-        <p:txBody>
-          <a:bodyPr rtlCol="0" anchor="ctr"/>
-          <a:lstStyle/>
-          <a:p>
-            <a:pPr algn="ctr"/>
-            <a:endParaRPr lang="en-US"/>
-          </a:p>
-        </p:txBody>
-      </p:sp>
-      <p:grpSp>
-        <p:nvGrpSpPr>
-          <p:cNvPr id="18" name="Group 17"/>
-          <p:cNvGrpSpPr/>
-          <p:nvPr/>
-        </p:nvGrpSpPr>
-        <p:grpSpPr>
-          <a:xfrm>
-            <a:off x="518906" y="192847"/>
-            <a:ext cx="9183755" cy="2908062"/>
-            <a:chOff x="187602" y="3214342"/>
-            <a:chExt cx="9183755" cy="2908062"/>
-          </a:xfrm>
-        </p:grpSpPr>
-        <p:grpSp>
-          <p:nvGrpSpPr>
-            <p:cNvPr id="11" name="Group 10"/>
-            <p:cNvGrpSpPr/>
-            <p:nvPr/>
-          </p:nvGrpSpPr>
-          <p:grpSpPr>
-            <a:xfrm>
-              <a:off x="187602" y="3214342"/>
-              <a:ext cx="2709896" cy="2908062"/>
-              <a:chOff x="5474619" y="2590316"/>
-              <a:chExt cx="2042419" cy="2191775"/>
-            </a:xfrm>
-          </p:grpSpPr>
-          <p:sp>
-            <p:nvSpPr>
-              <p:cNvPr id="12" name="Triangle 11"/>
-              <p:cNvSpPr/>
-              <p:nvPr/>
-            </p:nvSpPr>
-            <p:spPr>
-              <a:xfrm rot="10800000">
-                <a:off x="5474619" y="3021385"/>
-                <a:ext cx="2042419" cy="1760706"/>
-              </a:xfrm>
-              <a:prstGeom prst="triangle">
-                <a:avLst/>
-              </a:prstGeom>
-              <a:solidFill>
-                <a:schemeClr val="bg1"/>
-              </a:solidFill>
-              <a:ln>
-                <a:solidFill>
-                  <a:schemeClr val="bg1"/>
-                </a:solidFill>
-              </a:ln>
-              <a:effectLst>
-                <a:innerShdw blurRad="63500" dist="50800">
-                  <a:prstClr val="black">
-                    <a:alpha val="50000"/>
-                  </a:prstClr>
-                </a:innerShdw>
-                <a:softEdge rad="12700"/>
-              </a:effectLst>
-            </p:spPr>
-            <p:style>
-              <a:lnRef idx="2">
-                <a:schemeClr val="accent1">
-                  <a:shade val="50000"/>
-                </a:schemeClr>
-              </a:lnRef>
-              <a:fillRef idx="1">
-                <a:schemeClr val="accent1"/>
-              </a:fillRef>
-              <a:effectRef idx="0">
-                <a:schemeClr val="accent1"/>
-              </a:effectRef>
-              <a:fontRef idx="minor">
-                <a:schemeClr val="lt1"/>
-              </a:fontRef>
-            </p:style>
-            <p:txBody>
-              <a:bodyPr rtlCol="0" anchor="ctr"/>
-              <a:lstStyle/>
-              <a:p>
-                <a:pPr algn="ctr"/>
-                <a:endParaRPr lang="en-US"/>
-              </a:p>
-            </p:txBody>
-          </p:sp>
-          <p:sp>
-            <p:nvSpPr>
-              <p:cNvPr id="13" name="Freeform 12"/>
-              <p:cNvSpPr/>
-              <p:nvPr/>
-            </p:nvSpPr>
-            <p:spPr>
-              <a:xfrm>
-                <a:off x="6018203" y="3625933"/>
-                <a:ext cx="971991" cy="275075"/>
-              </a:xfrm>
-              <a:custGeom>
-                <a:avLst/>
-                <a:gdLst>
-                  <a:gd name="connsiteX0" fmla="*/ 0 w 971991"/>
-                  <a:gd name="connsiteY0" fmla="*/ 0 h 275075"/>
-                  <a:gd name="connsiteX1" fmla="*/ 136099 w 971991"/>
-                  <a:gd name="connsiteY1" fmla="*/ 0 h 275075"/>
-                  <a:gd name="connsiteX2" fmla="*/ 139195 w 971991"/>
-                  <a:gd name="connsiteY2" fmla="*/ 13789 h 275075"/>
-                  <a:gd name="connsiteX3" fmla="*/ 485995 w 971991"/>
-                  <a:gd name="connsiteY3" fmla="*/ 140704 h 275075"/>
-                  <a:gd name="connsiteX4" fmla="*/ 832795 w 971991"/>
-                  <a:gd name="connsiteY4" fmla="*/ 13789 h 275075"/>
-                  <a:gd name="connsiteX5" fmla="*/ 835891 w 971991"/>
-                  <a:gd name="connsiteY5" fmla="*/ 0 h 275075"/>
-                  <a:gd name="connsiteX6" fmla="*/ 971991 w 971991"/>
-                  <a:gd name="connsiteY6" fmla="*/ 0 h 275075"/>
-                  <a:gd name="connsiteX7" fmla="*/ 965121 w 971991"/>
-                  <a:gd name="connsiteY7" fmla="*/ 40870 h 275075"/>
-                  <a:gd name="connsiteX8" fmla="*/ 485995 w 971991"/>
-                  <a:gd name="connsiteY8" fmla="*/ 275075 h 275075"/>
-                  <a:gd name="connsiteX9" fmla="*/ 6869 w 971991"/>
-                  <a:gd name="connsiteY9" fmla="*/ 40870 h 275075"/>
-                </a:gdLst>
-                <a:ahLst/>
-                <a:cxnLst>
-                  <a:cxn ang="0">
-                    <a:pos x="connsiteX0" y="connsiteY0"/>
-                  </a:cxn>
-                  <a:cxn ang="0">
-                    <a:pos x="connsiteX1" y="connsiteY1"/>
-                  </a:cxn>
-                  <a:cxn ang="0">
-                    <a:pos x="connsiteX2" y="connsiteY2"/>
-                  </a:cxn>
-                  <a:cxn ang="0">
-                    <a:pos x="connsiteX3" y="connsiteY3"/>
-                  </a:cxn>
-                  <a:cxn ang="0">
-                    <a:pos x="connsiteX4" y="connsiteY4"/>
-                  </a:cxn>
-                  <a:cxn ang="0">
-                    <a:pos x="connsiteX5" y="connsiteY5"/>
-                  </a:cxn>
-                  <a:cxn ang="0">
-                    <a:pos x="connsiteX6" y="connsiteY6"/>
-                  </a:cxn>
-                  <a:cxn ang="0">
-                    <a:pos x="connsiteX7" y="connsiteY7"/>
-                  </a:cxn>
-                  <a:cxn ang="0">
-                    <a:pos x="connsiteX8" y="connsiteY8"/>
-                  </a:cxn>
-                  <a:cxn ang="0">
-                    <a:pos x="connsiteX9" y="connsiteY9"/>
-                  </a:cxn>
-                </a:cxnLst>
-                <a:rect l="l" t="t" r="r" b="b"/>
-                <a:pathLst>
-                  <a:path w="971991" h="275075">
-                    <a:moveTo>
-                      <a:pt x="0" y="0"/>
-                    </a:moveTo>
-                    <a:lnTo>
-                      <a:pt x="136099" y="0"/>
-                    </a:lnTo>
-                    <a:lnTo>
-                      <a:pt x="139195" y="13789"/>
-                    </a:lnTo>
-                    <a:cubicBezTo>
-                      <a:pt x="172204" y="86219"/>
-                      <a:pt x="314929" y="140704"/>
-                      <a:pt x="485995" y="140704"/>
-                    </a:cubicBezTo>
-                    <a:cubicBezTo>
-                      <a:pt x="657061" y="140704"/>
-                      <a:pt x="799787" y="86219"/>
-                      <a:pt x="832795" y="13789"/>
-                    </a:cubicBezTo>
-                    <a:lnTo>
-                      <a:pt x="835891" y="0"/>
-                    </a:lnTo>
-                    <a:lnTo>
-                      <a:pt x="971991" y="0"/>
-                    </a:lnTo>
-                    <a:lnTo>
-                      <a:pt x="965121" y="40870"/>
-                    </a:lnTo>
-                    <a:cubicBezTo>
-                      <a:pt x="919518" y="174531"/>
-                      <a:pt x="722334" y="275075"/>
-                      <a:pt x="485995" y="275075"/>
-                    </a:cubicBezTo>
-                    <a:cubicBezTo>
-                      <a:pt x="249657" y="275075"/>
-                      <a:pt x="52473" y="174531"/>
-                      <a:pt x="6869" y="40870"/>
-                    </a:cubicBezTo>
-                    <a:close/>
-                  </a:path>
-                </a:pathLst>
-              </a:custGeom>
-              <a:solidFill>
-                <a:srgbClr val="76D6D2"/>
-              </a:solidFill>
-              <a:ln w="127000">
-                <a:noFill/>
-              </a:ln>
-              <a:effectLst/>
-            </p:spPr>
-            <p:style>
-              <a:lnRef idx="2">
-                <a:schemeClr val="accent1">
-                  <a:shade val="50000"/>
-                </a:schemeClr>
-              </a:lnRef>
-              <a:fillRef idx="1">
-                <a:schemeClr val="accent1"/>
-              </a:fillRef>
-              <a:effectRef idx="0">
-                <a:schemeClr val="accent1"/>
-              </a:effectRef>
-              <a:fontRef idx="minor">
-                <a:schemeClr val="lt1"/>
-              </a:fontRef>
-            </p:style>
-            <p:txBody>
-              <a:bodyPr wrap="square" rtlCol="0" anchor="ctr">
-                <a:noAutofit/>
-              </a:bodyPr>
-              <a:lstStyle/>
-              <a:p>
-                <a:pPr algn="ctr"/>
-                <a:endParaRPr lang="en-US"/>
-              </a:p>
-            </p:txBody>
-          </p:sp>
-          <p:sp>
-            <p:nvSpPr>
-              <p:cNvPr id="14" name="Freeform 13"/>
-              <p:cNvSpPr/>
-              <p:nvPr/>
-            </p:nvSpPr>
-            <p:spPr>
-              <a:xfrm rot="3600000">
-                <a:off x="5828061" y="2709145"/>
-                <a:ext cx="1802029" cy="1564371"/>
-              </a:xfrm>
-              <a:custGeom>
-                <a:avLst/>
-                <a:gdLst>
-                  <a:gd name="connsiteX0" fmla="*/ 767584 w 1802029"/>
-                  <a:gd name="connsiteY0" fmla="*/ 963405 h 1564371"/>
-                  <a:gd name="connsiteX1" fmla="*/ 902068 w 1802029"/>
-                  <a:gd name="connsiteY1" fmla="*/ 1196339 h 1564371"/>
-                  <a:gd name="connsiteX2" fmla="*/ 1036553 w 1802029"/>
-                  <a:gd name="connsiteY2" fmla="*/ 963405 h 1564371"/>
-                  <a:gd name="connsiteX3" fmla="*/ 899426 w 1802029"/>
-                  <a:gd name="connsiteY3" fmla="*/ 0 h 1564371"/>
-                  <a:gd name="connsiteX4" fmla="*/ 1090728 w 1802029"/>
-                  <a:gd name="connsiteY4" fmla="*/ 933178 h 1564371"/>
-                  <a:gd name="connsiteX5" fmla="*/ 1802029 w 1802029"/>
-                  <a:gd name="connsiteY5" fmla="*/ 1564371 h 1564371"/>
-                  <a:gd name="connsiteX6" fmla="*/ 895531 w 1802029"/>
-                  <a:gd name="connsiteY6" fmla="*/ 1262558 h 1564371"/>
-                  <a:gd name="connsiteX7" fmla="*/ 0 w 1802029"/>
-                  <a:gd name="connsiteY7" fmla="*/ 1560720 h 1564371"/>
-                  <a:gd name="connsiteX8" fmla="*/ 708333 w 1802029"/>
-                  <a:gd name="connsiteY8" fmla="*/ 932161 h 1564371"/>
-                </a:gdLst>
-                <a:ahLst/>
-                <a:cxnLst>
-                  <a:cxn ang="0">
-                    <a:pos x="connsiteX0" y="connsiteY0"/>
-                  </a:cxn>
-                  <a:cxn ang="0">
-                    <a:pos x="connsiteX1" y="connsiteY1"/>
-                  </a:cxn>
-                  <a:cxn ang="0">
-                    <a:pos x="connsiteX2" y="connsiteY2"/>
-                  </a:cxn>
-                  <a:cxn ang="0">
-                    <a:pos x="connsiteX3" y="connsiteY3"/>
-                  </a:cxn>
-                  <a:cxn ang="0">
-                    <a:pos x="connsiteX4" y="connsiteY4"/>
-                  </a:cxn>
-                  <a:cxn ang="0">
-                    <a:pos x="connsiteX5" y="connsiteY5"/>
-                  </a:cxn>
-                  <a:cxn ang="0">
-                    <a:pos x="connsiteX6" y="connsiteY6"/>
-                  </a:cxn>
-                  <a:cxn ang="0">
-                    <a:pos x="connsiteX7" y="connsiteY7"/>
-                  </a:cxn>
-                  <a:cxn ang="0">
-                    <a:pos x="connsiteX8" y="connsiteY8"/>
-                  </a:cxn>
-                </a:cxnLst>
-                <a:rect l="l" t="t" r="r" b="b"/>
-                <a:pathLst>
-                  <a:path w="1802029" h="1564371">
-                    <a:moveTo>
-                      <a:pt x="767584" y="963405"/>
-                    </a:moveTo>
-                    <a:lnTo>
-                      <a:pt x="902068" y="1196339"/>
-                    </a:lnTo>
-                    <a:lnTo>
-                      <a:pt x="1036553" y="963405"/>
-                    </a:lnTo>
-                    <a:close/>
-                    <a:moveTo>
-                      <a:pt x="899426" y="0"/>
-                    </a:moveTo>
-                    <a:lnTo>
-                      <a:pt x="1090728" y="933178"/>
-                    </a:lnTo>
-                    <a:lnTo>
-                      <a:pt x="1802029" y="1564371"/>
-                    </a:lnTo>
-                    <a:lnTo>
-                      <a:pt x="895531" y="1262558"/>
-                    </a:lnTo>
-                    <a:lnTo>
-                      <a:pt x="0" y="1560720"/>
-                    </a:lnTo>
-                    <a:lnTo>
-                      <a:pt x="708333" y="932161"/>
-                    </a:lnTo>
-                    <a:close/>
-                  </a:path>
-                </a:pathLst>
-              </a:custGeom>
-              <a:solidFill>
-                <a:schemeClr val="tx1"/>
-              </a:solidFill>
-              <a:ln>
-                <a:noFill/>
-              </a:ln>
-              <a:effectLst>
-                <a:softEdge rad="0"/>
-              </a:effectLst>
-            </p:spPr>
-            <p:style>
-              <a:lnRef idx="2">
-                <a:schemeClr val="accent1">
-                  <a:shade val="50000"/>
-                </a:schemeClr>
-              </a:lnRef>
-              <a:fillRef idx="1">
-                <a:schemeClr val="accent1"/>
-              </a:fillRef>
-              <a:effectRef idx="0">
-                <a:schemeClr val="accent1"/>
-              </a:effectRef>
-              <a:fontRef idx="minor">
-                <a:schemeClr val="lt1"/>
-              </a:fontRef>
-            </p:style>
-            <p:txBody>
-              <a:bodyPr wrap="square" rtlCol="0" anchor="ctr">
-                <a:noAutofit/>
-              </a:bodyPr>
-              <a:lstStyle/>
-              <a:p>
-                <a:pPr algn="ctr"/>
-                <a:endParaRPr lang="en-US"/>
-              </a:p>
-            </p:txBody>
-          </p:sp>
-          <p:sp>
-            <p:nvSpPr>
-              <p:cNvPr id="15" name="Freeform 14"/>
-              <p:cNvSpPr/>
-              <p:nvPr/>
-            </p:nvSpPr>
-            <p:spPr>
-              <a:xfrm rot="10800000">
-                <a:off x="6018203" y="3353643"/>
-                <a:ext cx="971991" cy="275075"/>
-              </a:xfrm>
-              <a:custGeom>
-                <a:avLst/>
-                <a:gdLst>
-                  <a:gd name="connsiteX0" fmla="*/ 0 w 971991"/>
-                  <a:gd name="connsiteY0" fmla="*/ 0 h 275075"/>
-                  <a:gd name="connsiteX1" fmla="*/ 136099 w 971991"/>
-                  <a:gd name="connsiteY1" fmla="*/ 0 h 275075"/>
-                  <a:gd name="connsiteX2" fmla="*/ 139195 w 971991"/>
-                  <a:gd name="connsiteY2" fmla="*/ 13789 h 275075"/>
-                  <a:gd name="connsiteX3" fmla="*/ 485995 w 971991"/>
-                  <a:gd name="connsiteY3" fmla="*/ 140704 h 275075"/>
-                  <a:gd name="connsiteX4" fmla="*/ 832795 w 971991"/>
-                  <a:gd name="connsiteY4" fmla="*/ 13789 h 275075"/>
-                  <a:gd name="connsiteX5" fmla="*/ 835891 w 971991"/>
-                  <a:gd name="connsiteY5" fmla="*/ 0 h 275075"/>
-                  <a:gd name="connsiteX6" fmla="*/ 971991 w 971991"/>
-                  <a:gd name="connsiteY6" fmla="*/ 0 h 275075"/>
-                  <a:gd name="connsiteX7" fmla="*/ 965121 w 971991"/>
-                  <a:gd name="connsiteY7" fmla="*/ 40870 h 275075"/>
-                  <a:gd name="connsiteX8" fmla="*/ 485995 w 971991"/>
-                  <a:gd name="connsiteY8" fmla="*/ 275075 h 275075"/>
-                  <a:gd name="connsiteX9" fmla="*/ 6869 w 971991"/>
-                  <a:gd name="connsiteY9" fmla="*/ 40870 h 275075"/>
-                </a:gdLst>
-                <a:ahLst/>
-                <a:cxnLst>
-                  <a:cxn ang="0">
-                    <a:pos x="connsiteX0" y="connsiteY0"/>
-                  </a:cxn>
-                  <a:cxn ang="0">
-                    <a:pos x="connsiteX1" y="connsiteY1"/>
-                  </a:cxn>
-                  <a:cxn ang="0">
-                    <a:pos x="connsiteX2" y="connsiteY2"/>
-                  </a:cxn>
-                  <a:cxn ang="0">
-                    <a:pos x="connsiteX3" y="connsiteY3"/>
-                  </a:cxn>
-                  <a:cxn ang="0">
-                    <a:pos x="connsiteX4" y="connsiteY4"/>
-                  </a:cxn>
-                  <a:cxn ang="0">
-                    <a:pos x="connsiteX5" y="connsiteY5"/>
-                  </a:cxn>
-                  <a:cxn ang="0">
-                    <a:pos x="connsiteX6" y="connsiteY6"/>
-                  </a:cxn>
-                  <a:cxn ang="0">
-                    <a:pos x="connsiteX7" y="connsiteY7"/>
-                  </a:cxn>
-                  <a:cxn ang="0">
-                    <a:pos x="connsiteX8" y="connsiteY8"/>
-                  </a:cxn>
-                  <a:cxn ang="0">
-                    <a:pos x="connsiteX9" y="connsiteY9"/>
-                  </a:cxn>
-                </a:cxnLst>
-                <a:rect l="l" t="t" r="r" b="b"/>
-                <a:pathLst>
-                  <a:path w="971991" h="275075">
-                    <a:moveTo>
-                      <a:pt x="0" y="0"/>
-                    </a:moveTo>
-                    <a:lnTo>
-                      <a:pt x="136099" y="0"/>
-                    </a:lnTo>
-                    <a:lnTo>
-                      <a:pt x="139195" y="13789"/>
-                    </a:lnTo>
-                    <a:cubicBezTo>
-                      <a:pt x="172204" y="86219"/>
-                      <a:pt x="314929" y="140704"/>
-                      <a:pt x="485995" y="140704"/>
-                    </a:cubicBezTo>
-                    <a:cubicBezTo>
-                      <a:pt x="657061" y="140704"/>
-                      <a:pt x="799787" y="86219"/>
-                      <a:pt x="832795" y="13789"/>
-                    </a:cubicBezTo>
-                    <a:lnTo>
-                      <a:pt x="835891" y="0"/>
-                    </a:lnTo>
-                    <a:lnTo>
-                      <a:pt x="971991" y="0"/>
-                    </a:lnTo>
-                    <a:lnTo>
-                      <a:pt x="965121" y="40870"/>
-                    </a:lnTo>
-                    <a:cubicBezTo>
-                      <a:pt x="919518" y="174531"/>
-                      <a:pt x="722334" y="275075"/>
-                      <a:pt x="485995" y="275075"/>
-                    </a:cubicBezTo>
-                    <a:cubicBezTo>
-                      <a:pt x="249657" y="275075"/>
-                      <a:pt x="52473" y="174531"/>
-                      <a:pt x="6869" y="40870"/>
-                    </a:cubicBezTo>
-                    <a:close/>
-                  </a:path>
-                </a:pathLst>
-              </a:custGeom>
-              <a:solidFill>
-                <a:srgbClr val="76D6D2"/>
-              </a:solidFill>
-              <a:ln w="127000">
-                <a:noFill/>
-              </a:ln>
-              <a:effectLst/>
-            </p:spPr>
-            <p:style>
-              <a:lnRef idx="2">
-                <a:schemeClr val="accent1">
-                  <a:shade val="50000"/>
-                </a:schemeClr>
-              </a:lnRef>
-              <a:fillRef idx="1">
-                <a:schemeClr val="accent1"/>
-              </a:fillRef>
-              <a:effectRef idx="0">
-                <a:schemeClr val="accent1"/>
-              </a:effectRef>
-              <a:fontRef idx="minor">
-                <a:schemeClr val="lt1"/>
-              </a:fontRef>
-            </p:style>
-            <p:txBody>
-              <a:bodyPr wrap="square" rtlCol="0" anchor="ctr">
-                <a:noAutofit/>
-              </a:bodyPr>
-              <a:lstStyle/>
-              <a:p>
-                <a:pPr algn="ctr"/>
-                <a:endParaRPr lang="en-US"/>
-              </a:p>
-            </p:txBody>
-          </p:sp>
-        </p:grpSp>
-        <p:sp>
-          <p:nvSpPr>
-            <p:cNvPr id="16" name="TextBox 15"/>
-            <p:cNvSpPr txBox="1"/>
-            <p:nvPr/>
-          </p:nvSpPr>
-          <p:spPr>
-            <a:xfrm>
-              <a:off x="2897497" y="3621933"/>
-              <a:ext cx="6473860" cy="2092881"/>
-            </a:xfrm>
-            <a:prstGeom prst="rect">
-              <a:avLst/>
-            </a:prstGeom>
-            <a:noFill/>
-          </p:spPr>
-          <p:txBody>
-            <a:bodyPr wrap="square" rtlCol="0">
-              <a:spAutoFit/>
-            </a:bodyPr>
-            <a:lstStyle/>
-            <a:p>
-              <a:r>
-                <a:rPr lang="en-US" sz="13000" b="1" dirty="0" smtClean="0">
-                  <a:solidFill>
-                    <a:schemeClr val="bg1"/>
-                  </a:solidFill>
-                  <a:latin typeface="Futura Medium" charset="0"/>
-                  <a:ea typeface="Futura Medium" charset="0"/>
-                  <a:cs typeface="Futura Medium" charset="0"/>
-                </a:rPr>
-                <a:t>Enpact</a:t>
-              </a:r>
-              <a:endParaRPr lang="en-US" sz="13000" b="1" dirty="0">
-                <a:solidFill>
-                  <a:schemeClr val="bg1"/>
-                </a:solidFill>
-                <a:latin typeface="Futura Medium" charset="0"/>
-                <a:ea typeface="Futura Medium" charset="0"/>
-                <a:cs typeface="Futura Medium" charset="0"/>
-              </a:endParaRPr>
-            </a:p>
-          </p:txBody>
-        </p:sp>
-      </p:grpSp>
-      <p:sp>
-        <p:nvSpPr>
-          <p:cNvPr id="19" name="Rounded Rectangle 18"/>
-          <p:cNvSpPr/>
-          <p:nvPr/>
-        </p:nvSpPr>
-        <p:spPr>
-          <a:xfrm>
-            <a:off x="238539" y="3462187"/>
-            <a:ext cx="9144000" cy="3269210"/>
-          </a:xfrm>
-          <a:prstGeom prst="roundRect">
-            <a:avLst/>
-          </a:prstGeom>
-          <a:solidFill>
-            <a:schemeClr val="tx1"/>
-          </a:solidFill>
-          <a:effectLst>
-            <a:outerShdw blurRad="63500" sx="102000" sy="102000" algn="ctr" rotWithShape="0">
-              <a:prstClr val="black">
-                <a:alpha val="40000"/>
-              </a:prstClr>
-            </a:outerShdw>
-          </a:effectLst>
-        </p:spPr>
-        <p:style>
-          <a:lnRef idx="2">
-            <a:schemeClr val="accent1">
-              <a:shade val="50000"/>
-            </a:schemeClr>
-          </a:lnRef>
-          <a:fillRef idx="1">
-            <a:schemeClr val="accent1"/>
-          </a:fillRef>
-          <a:effectRef idx="0">
-            <a:schemeClr val="accent1"/>
-          </a:effectRef>
-          <a:fontRef idx="minor">
-            <a:schemeClr val="lt1"/>
-          </a:fontRef>
-        </p:style>
-        <p:txBody>
-          <a:bodyPr rtlCol="0" anchor="ctr"/>
-          <a:lstStyle/>
-          <a:p>
-            <a:pPr algn="ctr"/>
-            <a:endParaRPr lang="en-US"/>
-          </a:p>
-        </p:txBody>
-      </p:sp>
-      <p:grpSp>
-        <p:nvGrpSpPr>
-          <p:cNvPr id="3" name="Group 2"/>
-          <p:cNvGrpSpPr/>
-          <p:nvPr/>
-        </p:nvGrpSpPr>
-        <p:grpSpPr>
-          <a:xfrm>
-            <a:off x="923579" y="4034002"/>
-            <a:ext cx="8127656" cy="2092881"/>
-            <a:chOff x="1162118" y="3949781"/>
-            <a:chExt cx="8127656" cy="2092881"/>
-          </a:xfrm>
-        </p:grpSpPr>
-        <p:sp>
-          <p:nvSpPr>
-            <p:cNvPr id="20" name="TextBox 19"/>
-            <p:cNvSpPr txBox="1"/>
-            <p:nvPr/>
-          </p:nvSpPr>
-          <p:spPr>
-            <a:xfrm>
-              <a:off x="3276225" y="3949781"/>
-              <a:ext cx="6013549" cy="2092881"/>
-            </a:xfrm>
-            <a:prstGeom prst="rect">
-              <a:avLst/>
-            </a:prstGeom>
-            <a:noFill/>
-          </p:spPr>
-          <p:txBody>
-            <a:bodyPr wrap="square" rtlCol="0">
-              <a:spAutoFit/>
-            </a:bodyPr>
-            <a:lstStyle/>
-            <a:p>
-              <a:r>
-                <a:rPr lang="en-US" sz="13000" b="1" dirty="0" smtClean="0">
-                  <a:solidFill>
-                    <a:schemeClr val="bg1"/>
-                  </a:solidFill>
-                  <a:latin typeface="Futura Medium" charset="0"/>
-                  <a:ea typeface="Futura Medium" charset="0"/>
-                  <a:cs typeface="Futura Medium" charset="0"/>
-                </a:rPr>
-                <a:t>Enpact</a:t>
-              </a:r>
-              <a:endParaRPr lang="en-US" sz="13000" b="1" dirty="0">
-                <a:solidFill>
-                  <a:schemeClr val="bg1"/>
-                </a:solidFill>
-                <a:latin typeface="Futura Medium" charset="0"/>
-                <a:ea typeface="Futura Medium" charset="0"/>
-                <a:cs typeface="Futura Medium" charset="0"/>
-              </a:endParaRPr>
-            </a:p>
-          </p:txBody>
-        </p:sp>
-        <p:grpSp>
-          <p:nvGrpSpPr>
-            <p:cNvPr id="2" name="Group 1"/>
-            <p:cNvGrpSpPr/>
-            <p:nvPr/>
-          </p:nvGrpSpPr>
-          <p:grpSpPr>
-            <a:xfrm>
-              <a:off x="1162118" y="4115868"/>
-              <a:ext cx="2042419" cy="1760706"/>
-              <a:chOff x="4841522" y="2676981"/>
-              <a:chExt cx="2042419" cy="1760706"/>
-            </a:xfrm>
-          </p:grpSpPr>
-          <p:sp>
-            <p:nvSpPr>
-              <p:cNvPr id="21" name="Triangle 20"/>
-              <p:cNvSpPr/>
-              <p:nvPr/>
-            </p:nvSpPr>
-            <p:spPr>
-              <a:xfrm rot="10800000">
-                <a:off x="4841522" y="2676981"/>
-                <a:ext cx="2042419" cy="1760706"/>
-              </a:xfrm>
-              <a:prstGeom prst="triangle">
-                <a:avLst/>
-              </a:prstGeom>
-              <a:solidFill>
-                <a:schemeClr val="bg1"/>
-              </a:solidFill>
-              <a:ln>
-                <a:solidFill>
-                  <a:schemeClr val="bg1"/>
-                </a:solidFill>
-              </a:ln>
-            </p:spPr>
-            <p:style>
-              <a:lnRef idx="2">
-                <a:schemeClr val="accent1">
-                  <a:shade val="50000"/>
-                </a:schemeClr>
-              </a:lnRef>
-              <a:fillRef idx="1">
-                <a:schemeClr val="accent1"/>
-              </a:fillRef>
-              <a:effectRef idx="0">
-                <a:schemeClr val="accent1"/>
-              </a:effectRef>
-              <a:fontRef idx="minor">
-                <a:schemeClr val="lt1"/>
-              </a:fontRef>
-            </p:style>
-            <p:txBody>
-              <a:bodyPr rtlCol="0" anchor="ctr"/>
-              <a:lstStyle/>
-              <a:p>
-                <a:pPr algn="ctr"/>
-                <a:endParaRPr lang="en-US"/>
-              </a:p>
-            </p:txBody>
-          </p:sp>
-          <p:sp>
-            <p:nvSpPr>
-              <p:cNvPr id="22" name="Triangle 21"/>
-              <p:cNvSpPr/>
-              <p:nvPr/>
-            </p:nvSpPr>
-            <p:spPr>
-              <a:xfrm rot="3600000">
-                <a:off x="6157913" y="2513607"/>
-                <a:ext cx="394996" cy="963405"/>
-              </a:xfrm>
-              <a:prstGeom prst="triangle">
-                <a:avLst/>
-              </a:prstGeom>
-              <a:solidFill>
-                <a:schemeClr val="tx1"/>
-              </a:solidFill>
-              <a:ln>
-                <a:solidFill>
-                  <a:schemeClr val="tx1"/>
-                </a:solidFill>
-              </a:ln>
-            </p:spPr>
-            <p:style>
-              <a:lnRef idx="2">
-                <a:schemeClr val="accent1">
-                  <a:shade val="50000"/>
-                </a:schemeClr>
-              </a:lnRef>
-              <a:fillRef idx="1">
-                <a:schemeClr val="accent1"/>
-              </a:fillRef>
-              <a:effectRef idx="0">
-                <a:schemeClr val="accent1"/>
-              </a:effectRef>
-              <a:fontRef idx="minor">
-                <a:schemeClr val="lt1"/>
-              </a:fontRef>
-            </p:style>
-            <p:txBody>
-              <a:bodyPr rtlCol="0" anchor="ctr"/>
-              <a:lstStyle/>
-              <a:p>
-                <a:pPr algn="ctr"/>
-                <a:endParaRPr lang="en-US"/>
-              </a:p>
-            </p:txBody>
-          </p:sp>
-          <p:sp>
-            <p:nvSpPr>
-              <p:cNvPr id="23" name="Triangle 22"/>
-              <p:cNvSpPr/>
-              <p:nvPr/>
-            </p:nvSpPr>
-            <p:spPr>
-              <a:xfrm rot="18000000">
-                <a:off x="5190910" y="2515041"/>
-                <a:ext cx="394996" cy="963405"/>
-              </a:xfrm>
-              <a:prstGeom prst="triangle">
-                <a:avLst/>
-              </a:prstGeom>
-              <a:solidFill>
-                <a:schemeClr val="tx1"/>
-              </a:solidFill>
-              <a:ln>
-                <a:solidFill>
-                  <a:schemeClr val="tx1"/>
-                </a:solidFill>
-              </a:ln>
-            </p:spPr>
-            <p:style>
-              <a:lnRef idx="2">
-                <a:schemeClr val="accent1">
-                  <a:shade val="50000"/>
-                </a:schemeClr>
-              </a:lnRef>
-              <a:fillRef idx="1">
-                <a:schemeClr val="accent1"/>
-              </a:fillRef>
-              <a:effectRef idx="0">
-                <a:schemeClr val="accent1"/>
-              </a:effectRef>
-              <a:fontRef idx="minor">
-                <a:schemeClr val="lt1"/>
-              </a:fontRef>
-            </p:style>
-            <p:txBody>
-              <a:bodyPr rtlCol="0" anchor="ctr"/>
-              <a:lstStyle/>
-              <a:p>
-                <a:pPr algn="ctr"/>
-                <a:endParaRPr lang="en-US"/>
-              </a:p>
-            </p:txBody>
-          </p:sp>
-          <p:sp>
-            <p:nvSpPr>
-              <p:cNvPr id="24" name="Oval 23"/>
-              <p:cNvSpPr/>
-              <p:nvPr/>
-            </p:nvSpPr>
-            <p:spPr>
-              <a:xfrm>
-                <a:off x="5453698" y="3055666"/>
-                <a:ext cx="830786" cy="452907"/>
-              </a:xfrm>
-              <a:prstGeom prst="ellipse">
-                <a:avLst/>
-              </a:prstGeom>
-              <a:noFill/>
-              <a:ln w="127000">
-                <a:solidFill>
-                  <a:srgbClr val="76D6D2"/>
-                </a:solidFill>
-              </a:ln>
-              <a:effectLst/>
-            </p:spPr>
-            <p:style>
-              <a:lnRef idx="2">
-                <a:schemeClr val="accent1">
-                  <a:shade val="50000"/>
-                </a:schemeClr>
-              </a:lnRef>
-              <a:fillRef idx="1">
-                <a:schemeClr val="accent1"/>
-              </a:fillRef>
-              <a:effectRef idx="0">
-                <a:schemeClr val="accent1"/>
-              </a:effectRef>
-              <a:fontRef idx="minor">
-                <a:schemeClr val="lt1"/>
-              </a:fontRef>
-            </p:style>
-            <p:txBody>
-              <a:bodyPr rtlCol="0" anchor="ctr"/>
-              <a:lstStyle/>
-              <a:p>
-                <a:pPr algn="ctr"/>
-                <a:endParaRPr lang="en-US"/>
-              </a:p>
-            </p:txBody>
-          </p:sp>
-          <p:sp>
-            <p:nvSpPr>
-              <p:cNvPr id="25" name="Triangle 24"/>
-              <p:cNvSpPr/>
-              <p:nvPr/>
-            </p:nvSpPr>
-            <p:spPr>
-              <a:xfrm rot="10800000">
-                <a:off x="5671595" y="3354916"/>
-                <a:ext cx="394996" cy="963405"/>
-              </a:xfrm>
-              <a:prstGeom prst="triangle">
-                <a:avLst/>
-              </a:prstGeom>
-              <a:solidFill>
-                <a:schemeClr val="tx1"/>
-              </a:solidFill>
-              <a:ln>
-                <a:solidFill>
-                  <a:schemeClr val="tx1"/>
-                </a:solidFill>
-              </a:ln>
-            </p:spPr>
-            <p:style>
-              <a:lnRef idx="2">
-                <a:schemeClr val="accent1">
-                  <a:shade val="50000"/>
-                </a:schemeClr>
-              </a:lnRef>
-              <a:fillRef idx="1">
-                <a:schemeClr val="accent1"/>
-              </a:fillRef>
-              <a:effectRef idx="0">
-                <a:schemeClr val="accent1"/>
-              </a:effectRef>
-              <a:fontRef idx="minor">
-                <a:schemeClr val="lt1"/>
-              </a:fontRef>
-            </p:style>
-            <p:txBody>
-              <a:bodyPr rtlCol="0" anchor="ctr"/>
-              <a:lstStyle/>
-              <a:p>
-                <a:pPr algn="ctr"/>
-                <a:endParaRPr lang="en-US"/>
-              </a:p>
-            </p:txBody>
-          </p:sp>
-        </p:grpSp>
-      </p:grpSp>
-    </p:spTree>
-    <p:extLst>
-      <p:ext uri="{BB962C8B-B14F-4D97-AF65-F5344CB8AC3E}">
-        <p14:creationId xmlns:p14="http://schemas.microsoft.com/office/powerpoint/2010/main" val="1919402068"/>
       </p:ext>
     </p:extLst>
   </p:cSld>

</xml_diff>

<commit_message>
Add view controllers for accessing run history. Add cadence data models and updated CadenceMetrics to collect the appropriate data
</commit_message>
<xml_diff>
--- a/Assets/RF1_iOS Image Assets.pptx
+++ b/Assets/RF1_iOS Image Assets.pptx
@@ -5,22 +5,23 @@
     <p:sldMasterId id="2147483660" r:id="rId1"/>
   </p:sldMasterIdLst>
   <p:notesMasterIdLst>
-    <p:notesMasterId r:id="rId15"/>
+    <p:notesMasterId r:id="rId16"/>
   </p:notesMasterIdLst>
   <p:sldIdLst>
     <p:sldId id="256" r:id="rId2"/>
     <p:sldId id="261" r:id="rId3"/>
-    <p:sldId id="263" r:id="rId4"/>
-    <p:sldId id="264" r:id="rId5"/>
-    <p:sldId id="265" r:id="rId6"/>
-    <p:sldId id="266" r:id="rId7"/>
-    <p:sldId id="267" r:id="rId8"/>
-    <p:sldId id="268" r:id="rId9"/>
-    <p:sldId id="262" r:id="rId10"/>
-    <p:sldId id="259" r:id="rId11"/>
-    <p:sldId id="257" r:id="rId12"/>
-    <p:sldId id="258" r:id="rId13"/>
-    <p:sldId id="260" r:id="rId14"/>
+    <p:sldId id="269" r:id="rId4"/>
+    <p:sldId id="263" r:id="rId5"/>
+    <p:sldId id="264" r:id="rId6"/>
+    <p:sldId id="265" r:id="rId7"/>
+    <p:sldId id="266" r:id="rId8"/>
+    <p:sldId id="267" r:id="rId9"/>
+    <p:sldId id="268" r:id="rId10"/>
+    <p:sldId id="262" r:id="rId11"/>
+    <p:sldId id="259" r:id="rId12"/>
+    <p:sldId id="257" r:id="rId13"/>
+    <p:sldId id="258" r:id="rId14"/>
+    <p:sldId id="260" r:id="rId15"/>
   </p:sldIdLst>
   <p:sldSz cx="9144000" cy="6858000" type="screen4x3"/>
   <p:notesSz cx="6858000" cy="9144000"/>
@@ -209,7 +210,7 @@
           <a:p>
             <a:fld id="{8F2978D3-65C1-0248-AA8D-E71F44BA97A8}" type="datetimeFigureOut">
               <a:rPr lang="en-US" smtClean="0"/>
-              <a:t>3/20/18</a:t>
+              <a:t>4/19/18</a:t>
             </a:fld>
             <a:endParaRPr lang="en-US"/>
           </a:p>
@@ -556,7 +557,7 @@
           <a:p>
             <a:fld id="{1EB18CB5-5427-B64F-A737-9ACE019C8FC1}" type="slidenum">
               <a:rPr lang="en-US" smtClean="0"/>
-              <a:t>11</a:t>
+              <a:t>12</a:t>
             </a:fld>
             <a:endParaRPr lang="en-US"/>
           </a:p>
@@ -706,7 +707,7 @@
           <a:p>
             <a:fld id="{AAF431F5-6ABC-B944-AA89-A7441EE7FB39}" type="datetimeFigureOut">
               <a:rPr lang="en-US" smtClean="0"/>
-              <a:t>3/20/18</a:t>
+              <a:t>4/19/18</a:t>
             </a:fld>
             <a:endParaRPr lang="en-US"/>
           </a:p>
@@ -871,7 +872,7 @@
           <a:p>
             <a:fld id="{AAF431F5-6ABC-B944-AA89-A7441EE7FB39}" type="datetimeFigureOut">
               <a:rPr lang="en-US" smtClean="0"/>
-              <a:t>3/20/18</a:t>
+              <a:t>4/19/18</a:t>
             </a:fld>
             <a:endParaRPr lang="en-US"/>
           </a:p>
@@ -1046,7 +1047,7 @@
           <a:p>
             <a:fld id="{AAF431F5-6ABC-B944-AA89-A7441EE7FB39}" type="datetimeFigureOut">
               <a:rPr lang="en-US" smtClean="0"/>
-              <a:t>3/20/18</a:t>
+              <a:t>4/19/18</a:t>
             </a:fld>
             <a:endParaRPr lang="en-US"/>
           </a:p>
@@ -1211,7 +1212,7 @@
           <a:p>
             <a:fld id="{AAF431F5-6ABC-B944-AA89-A7441EE7FB39}" type="datetimeFigureOut">
               <a:rPr lang="en-US" smtClean="0"/>
-              <a:t>3/20/18</a:t>
+              <a:t>4/19/18</a:t>
             </a:fld>
             <a:endParaRPr lang="en-US"/>
           </a:p>
@@ -1450,7 +1451,7 @@
           <a:p>
             <a:fld id="{AAF431F5-6ABC-B944-AA89-A7441EE7FB39}" type="datetimeFigureOut">
               <a:rPr lang="en-US" smtClean="0"/>
-              <a:t>3/20/18</a:t>
+              <a:t>4/19/18</a:t>
             </a:fld>
             <a:endParaRPr lang="en-US"/>
           </a:p>
@@ -1677,7 +1678,7 @@
           <a:p>
             <a:fld id="{AAF431F5-6ABC-B944-AA89-A7441EE7FB39}" type="datetimeFigureOut">
               <a:rPr lang="en-US" smtClean="0"/>
-              <a:t>3/20/18</a:t>
+              <a:t>4/19/18</a:t>
             </a:fld>
             <a:endParaRPr lang="en-US"/>
           </a:p>
@@ -2039,7 +2040,7 @@
           <a:p>
             <a:fld id="{AAF431F5-6ABC-B944-AA89-A7441EE7FB39}" type="datetimeFigureOut">
               <a:rPr lang="en-US" smtClean="0"/>
-              <a:t>3/20/18</a:t>
+              <a:t>4/19/18</a:t>
             </a:fld>
             <a:endParaRPr lang="en-US"/>
           </a:p>
@@ -2152,7 +2153,7 @@
           <a:p>
             <a:fld id="{AAF431F5-6ABC-B944-AA89-A7441EE7FB39}" type="datetimeFigureOut">
               <a:rPr lang="en-US" smtClean="0"/>
-              <a:t>3/20/18</a:t>
+              <a:t>4/19/18</a:t>
             </a:fld>
             <a:endParaRPr lang="en-US"/>
           </a:p>
@@ -2242,7 +2243,7 @@
           <a:p>
             <a:fld id="{AAF431F5-6ABC-B944-AA89-A7441EE7FB39}" type="datetimeFigureOut">
               <a:rPr lang="en-US" smtClean="0"/>
-              <a:t>3/20/18</a:t>
+              <a:t>4/19/18</a:t>
             </a:fld>
             <a:endParaRPr lang="en-US"/>
           </a:p>
@@ -2514,7 +2515,7 @@
           <a:p>
             <a:fld id="{AAF431F5-6ABC-B944-AA89-A7441EE7FB39}" type="datetimeFigureOut">
               <a:rPr lang="en-US" smtClean="0"/>
-              <a:t>3/20/18</a:t>
+              <a:t>4/19/18</a:t>
             </a:fld>
             <a:endParaRPr lang="en-US"/>
           </a:p>
@@ -2766,7 +2767,7 @@
           <a:p>
             <a:fld id="{AAF431F5-6ABC-B944-AA89-A7441EE7FB39}" type="datetimeFigureOut">
               <a:rPr lang="en-US" smtClean="0"/>
-              <a:t>3/20/18</a:t>
+              <a:t>4/19/18</a:t>
             </a:fld>
             <a:endParaRPr lang="en-US"/>
           </a:p>
@@ -2974,7 +2975,7 @@
           <a:p>
             <a:fld id="{AAF431F5-6ABC-B944-AA89-A7441EE7FB39}" type="datetimeFigureOut">
               <a:rPr lang="en-US" smtClean="0"/>
-              <a:t>3/20/18</a:t>
+              <a:t>4/19/18</a:t>
             </a:fld>
             <a:endParaRPr lang="en-US"/>
           </a:p>
@@ -3439,6 +3440,65 @@
 </file>
 
 <file path=ppt/slides/slide10.xml><?xml version="1.0" encoding="utf-8"?>
+<p:sld xmlns:a="http://schemas.openxmlformats.org/drawingml/2006/main" xmlns:r="http://schemas.openxmlformats.org/officeDocument/2006/relationships" xmlns:p="http://schemas.openxmlformats.org/presentationml/2006/main">
+  <p:cSld>
+    <p:spTree>
+      <p:nvGrpSpPr>
+        <p:cNvPr id="1" name=""/>
+        <p:cNvGrpSpPr/>
+        <p:nvPr/>
+      </p:nvGrpSpPr>
+      <p:grpSpPr>
+        <a:xfrm>
+          <a:off x="0" y="0"/>
+          <a:ext cx="0" cy="0"/>
+          <a:chOff x="0" y="0"/>
+          <a:chExt cx="0" cy="0"/>
+        </a:xfrm>
+      </p:grpSpPr>
+      <p:sp>
+        <p:nvSpPr>
+          <p:cNvPr id="2" name="Title 1"/>
+          <p:cNvSpPr>
+            <a:spLocks noGrp="1"/>
+          </p:cNvSpPr>
+          <p:nvPr>
+            <p:ph type="title"/>
+          </p:nvPr>
+        </p:nvSpPr>
+        <p:spPr>
+          <a:xfrm>
+            <a:off x="656359" y="2554144"/>
+            <a:ext cx="7886700" cy="1325563"/>
+          </a:xfrm>
+        </p:spPr>
+        <p:txBody>
+          <a:bodyPr/>
+          <a:lstStyle/>
+          <a:p>
+            <a:pPr algn="ctr"/>
+            <a:r>
+              <a:rPr lang="en-US" dirty="0" smtClean="0"/>
+              <a:t>Archive</a:t>
+            </a:r>
+            <a:endParaRPr lang="en-US" dirty="0"/>
+          </a:p>
+        </p:txBody>
+      </p:sp>
+    </p:spTree>
+    <p:extLst>
+      <p:ext uri="{BB962C8B-B14F-4D97-AF65-F5344CB8AC3E}">
+        <p14:creationId xmlns:p14="http://schemas.microsoft.com/office/powerpoint/2010/main" val="1565272403"/>
+      </p:ext>
+    </p:extLst>
+  </p:cSld>
+  <p:clrMapOvr>
+    <a:masterClrMapping/>
+  </p:clrMapOvr>
+</p:sld>
+</file>
+
+<file path=ppt/slides/slide11.xml><?xml version="1.0" encoding="utf-8"?>
 <p:sld xmlns:a="http://schemas.openxmlformats.org/drawingml/2006/main" xmlns:r="http://schemas.openxmlformats.org/officeDocument/2006/relationships" xmlns:p="http://schemas.openxmlformats.org/presentationml/2006/main">
   <p:cSld>
     <p:spTree>
@@ -4079,7 +4139,7 @@
 </p:sld>
 </file>
 
-<file path=ppt/slides/slide11.xml><?xml version="1.0" encoding="utf-8"?>
+<file path=ppt/slides/slide12.xml><?xml version="1.0" encoding="utf-8"?>
 <p:sld xmlns:a="http://schemas.openxmlformats.org/drawingml/2006/main" xmlns:r="http://schemas.openxmlformats.org/officeDocument/2006/relationships" xmlns:p="http://schemas.openxmlformats.org/presentationml/2006/main">
   <p:cSld>
     <p:spTree>
@@ -6075,7 +6135,7 @@
 </p:sld>
 </file>
 
-<file path=ppt/slides/slide12.xml><?xml version="1.0" encoding="utf-8"?>
+<file path=ppt/slides/slide13.xml><?xml version="1.0" encoding="utf-8"?>
 <p:sld xmlns:a="http://schemas.openxmlformats.org/drawingml/2006/main" xmlns:r="http://schemas.openxmlformats.org/officeDocument/2006/relationships" xmlns:p="http://schemas.openxmlformats.org/presentationml/2006/main">
   <p:cSld>
     <p:spTree>
@@ -7079,7 +7139,7 @@
 </p:sld>
 </file>
 
-<file path=ppt/slides/slide13.xml><?xml version="1.0" encoding="utf-8"?>
+<file path=ppt/slides/slide14.xml><?xml version="1.0" encoding="utf-8"?>
 <p:sld xmlns:a="http://schemas.openxmlformats.org/drawingml/2006/main" xmlns:r="http://schemas.openxmlformats.org/officeDocument/2006/relationships" xmlns:p="http://schemas.openxmlformats.org/presentationml/2006/main">
   <p:cSld>
     <p:spTree>
@@ -9209,6 +9269,436 @@
       </p:grpSpPr>
       <p:sp>
         <p:nvSpPr>
+          <p:cNvPr id="6" name="Rectangle 5"/>
+          <p:cNvSpPr/>
+          <p:nvPr/>
+        </p:nvSpPr>
+        <p:spPr>
+          <a:xfrm>
+            <a:off x="67633" y="3485322"/>
+            <a:ext cx="8911349" cy="3372678"/>
+          </a:xfrm>
+          <a:prstGeom prst="rect">
+            <a:avLst/>
+          </a:prstGeom>
+          <a:solidFill>
+            <a:schemeClr val="tx1"/>
+          </a:solidFill>
+          <a:ln>
+            <a:solidFill>
+              <a:schemeClr val="bg1"/>
+            </a:solidFill>
+          </a:ln>
+        </p:spPr>
+        <p:style>
+          <a:lnRef idx="2">
+            <a:schemeClr val="accent1">
+              <a:shade val="50000"/>
+            </a:schemeClr>
+          </a:lnRef>
+          <a:fillRef idx="1">
+            <a:schemeClr val="accent1"/>
+          </a:fillRef>
+          <a:effectRef idx="0">
+            <a:schemeClr val="accent1"/>
+          </a:effectRef>
+          <a:fontRef idx="minor">
+            <a:schemeClr val="lt1"/>
+          </a:fontRef>
+        </p:style>
+        <p:txBody>
+          <a:bodyPr rtlCol="0" anchor="ctr"/>
+          <a:lstStyle/>
+          <a:p>
+            <a:pPr algn="ctr"/>
+            <a:endParaRPr lang="en-US"/>
+          </a:p>
+        </p:txBody>
+      </p:sp>
+      <p:grpSp>
+        <p:nvGrpSpPr>
+          <p:cNvPr id="9" name="Group 8"/>
+          <p:cNvGrpSpPr/>
+          <p:nvPr/>
+        </p:nvGrpSpPr>
+        <p:grpSpPr>
+          <a:xfrm>
+            <a:off x="354535" y="4834314"/>
+            <a:ext cx="1702865" cy="1108359"/>
+            <a:chOff x="354535" y="4557725"/>
+            <a:chExt cx="2127799" cy="1384948"/>
+          </a:xfrm>
+        </p:grpSpPr>
+        <p:sp>
+          <p:nvSpPr>
+            <p:cNvPr id="7" name="Freeform 6"/>
+            <p:cNvSpPr/>
+            <p:nvPr/>
+          </p:nvSpPr>
+          <p:spPr>
+            <a:xfrm rot="5400000">
+              <a:off x="1495622" y="4263486"/>
+              <a:ext cx="277879" cy="1695545"/>
+            </a:xfrm>
+            <a:custGeom>
+              <a:avLst/>
+              <a:gdLst>
+                <a:gd name="connsiteX0" fmla="*/ 386787 w 386787"/>
+                <a:gd name="connsiteY0" fmla="*/ 2684760 h 2684760"/>
+                <a:gd name="connsiteX1" fmla="*/ 0 w 386787"/>
+                <a:gd name="connsiteY1" fmla="*/ 1342380 h 2684760"/>
+                <a:gd name="connsiteX2" fmla="*/ 386787 w 386787"/>
+                <a:gd name="connsiteY2" fmla="*/ 0 h 2684760"/>
+                <a:gd name="connsiteX3" fmla="*/ 386787 w 386787"/>
+                <a:gd name="connsiteY3" fmla="*/ 400971 h 2684760"/>
+                <a:gd name="connsiteX4" fmla="*/ 115534 w 386787"/>
+                <a:gd name="connsiteY4" fmla="*/ 1342380 h 2684760"/>
+                <a:gd name="connsiteX5" fmla="*/ 386787 w 386787"/>
+                <a:gd name="connsiteY5" fmla="*/ 2283789 h 2684760"/>
+              </a:gdLst>
+              <a:ahLst/>
+              <a:cxnLst>
+                <a:cxn ang="0">
+                  <a:pos x="connsiteX0" y="connsiteY0"/>
+                </a:cxn>
+                <a:cxn ang="0">
+                  <a:pos x="connsiteX1" y="connsiteY1"/>
+                </a:cxn>
+                <a:cxn ang="0">
+                  <a:pos x="connsiteX2" y="connsiteY2"/>
+                </a:cxn>
+                <a:cxn ang="0">
+                  <a:pos x="connsiteX3" y="connsiteY3"/>
+                </a:cxn>
+                <a:cxn ang="0">
+                  <a:pos x="connsiteX4" y="connsiteY4"/>
+                </a:cxn>
+                <a:cxn ang="0">
+                  <a:pos x="connsiteX5" y="connsiteY5"/>
+                </a:cxn>
+              </a:cxnLst>
+              <a:rect l="l" t="t" r="r" b="b"/>
+              <a:pathLst>
+                <a:path w="386787" h="2684760">
+                  <a:moveTo>
+                    <a:pt x="386787" y="2684760"/>
+                  </a:moveTo>
+                  <a:cubicBezTo>
+                    <a:pt x="173170" y="2684760"/>
+                    <a:pt x="0" y="2083756"/>
+                    <a:pt x="0" y="1342380"/>
+                  </a:cubicBezTo>
+                  <a:cubicBezTo>
+                    <a:pt x="0" y="601004"/>
+                    <a:pt x="173170" y="0"/>
+                    <a:pt x="386787" y="0"/>
+                  </a:cubicBezTo>
+                  <a:lnTo>
+                    <a:pt x="386787" y="400971"/>
+                  </a:lnTo>
+                  <a:cubicBezTo>
+                    <a:pt x="236978" y="400971"/>
+                    <a:pt x="115534" y="822454"/>
+                    <a:pt x="115534" y="1342380"/>
+                  </a:cubicBezTo>
+                  <a:cubicBezTo>
+                    <a:pt x="115534" y="1862306"/>
+                    <a:pt x="236978" y="2283789"/>
+                    <a:pt x="386787" y="2283789"/>
+                  </a:cubicBezTo>
+                  <a:close/>
+                </a:path>
+              </a:pathLst>
+            </a:custGeom>
+            <a:solidFill>
+              <a:schemeClr val="bg1"/>
+            </a:solidFill>
+            <a:ln w="127000">
+              <a:noFill/>
+            </a:ln>
+          </p:spPr>
+          <p:style>
+            <a:lnRef idx="2">
+              <a:schemeClr val="accent1">
+                <a:shade val="50000"/>
+              </a:schemeClr>
+            </a:lnRef>
+            <a:fillRef idx="1">
+              <a:schemeClr val="accent1"/>
+            </a:fillRef>
+            <a:effectRef idx="0">
+              <a:schemeClr val="accent1"/>
+            </a:effectRef>
+            <a:fontRef idx="minor">
+              <a:schemeClr val="lt1"/>
+            </a:fontRef>
+          </p:style>
+          <p:txBody>
+            <a:bodyPr rtlCol="0" anchor="ctr"/>
+            <a:lstStyle/>
+            <a:p>
+              <a:pPr algn="ctr"/>
+              <a:endParaRPr lang="en-US"/>
+            </a:p>
+          </p:txBody>
+        </p:sp>
+        <p:sp>
+          <p:nvSpPr>
+            <p:cNvPr id="4" name="Freeform 3"/>
+            <p:cNvSpPr/>
+            <p:nvPr/>
+          </p:nvSpPr>
+          <p:spPr>
+            <a:xfrm rot="8100000">
+              <a:off x="354535" y="4557725"/>
+              <a:ext cx="1384464" cy="1384948"/>
+            </a:xfrm>
+            <a:custGeom>
+              <a:avLst/>
+              <a:gdLst>
+                <a:gd name="connsiteX0" fmla="*/ 379693 w 1384464"/>
+                <a:gd name="connsiteY0" fmla="*/ 1384948 h 1384948"/>
+                <a:gd name="connsiteX1" fmla="*/ 0 w 1384464"/>
+                <a:gd name="connsiteY1" fmla="*/ 1384948 h 1384948"/>
+                <a:gd name="connsiteX2" fmla="*/ 0 w 1384464"/>
+                <a:gd name="connsiteY2" fmla="*/ 0 h 1384948"/>
+                <a:gd name="connsiteX3" fmla="*/ 1384464 w 1384464"/>
+                <a:gd name="connsiteY3" fmla="*/ 0 h 1384948"/>
+                <a:gd name="connsiteX4" fmla="*/ 1384464 w 1384464"/>
+                <a:gd name="connsiteY4" fmla="*/ 342907 h 1384948"/>
+                <a:gd name="connsiteX5" fmla="*/ 379693 w 1384464"/>
+                <a:gd name="connsiteY5" fmla="*/ 342907 h 1384948"/>
+              </a:gdLst>
+              <a:ahLst/>
+              <a:cxnLst>
+                <a:cxn ang="0">
+                  <a:pos x="connsiteX0" y="connsiteY0"/>
+                </a:cxn>
+                <a:cxn ang="0">
+                  <a:pos x="connsiteX1" y="connsiteY1"/>
+                </a:cxn>
+                <a:cxn ang="0">
+                  <a:pos x="connsiteX2" y="connsiteY2"/>
+                </a:cxn>
+                <a:cxn ang="0">
+                  <a:pos x="connsiteX3" y="connsiteY3"/>
+                </a:cxn>
+                <a:cxn ang="0">
+                  <a:pos x="connsiteX4" y="connsiteY4"/>
+                </a:cxn>
+                <a:cxn ang="0">
+                  <a:pos x="connsiteX5" y="connsiteY5"/>
+                </a:cxn>
+              </a:cxnLst>
+              <a:rect l="l" t="t" r="r" b="b"/>
+              <a:pathLst>
+                <a:path w="1384464" h="1384948">
+                  <a:moveTo>
+                    <a:pt x="379693" y="1384948"/>
+                  </a:moveTo>
+                  <a:lnTo>
+                    <a:pt x="0" y="1384948"/>
+                  </a:lnTo>
+                  <a:lnTo>
+                    <a:pt x="0" y="0"/>
+                  </a:lnTo>
+                  <a:lnTo>
+                    <a:pt x="1384464" y="0"/>
+                  </a:lnTo>
+                  <a:lnTo>
+                    <a:pt x="1384464" y="342907"/>
+                  </a:lnTo>
+                  <a:lnTo>
+                    <a:pt x="379693" y="342907"/>
+                  </a:lnTo>
+                  <a:close/>
+                </a:path>
+              </a:pathLst>
+            </a:custGeom>
+            <a:solidFill>
+              <a:schemeClr val="bg1">
+                <a:lumMod val="50000"/>
+              </a:schemeClr>
+            </a:solidFill>
+            <a:ln>
+              <a:noFill/>
+            </a:ln>
+          </p:spPr>
+          <p:style>
+            <a:lnRef idx="2">
+              <a:schemeClr val="accent1">
+                <a:shade val="50000"/>
+              </a:schemeClr>
+            </a:lnRef>
+            <a:fillRef idx="1">
+              <a:schemeClr val="accent1"/>
+            </a:fillRef>
+            <a:effectRef idx="0">
+              <a:schemeClr val="accent1"/>
+            </a:effectRef>
+            <a:fontRef idx="minor">
+              <a:schemeClr val="lt1"/>
+            </a:fontRef>
+          </p:style>
+          <p:txBody>
+            <a:bodyPr rtlCol="0" anchor="ctr"/>
+            <a:lstStyle/>
+            <a:p>
+              <a:pPr algn="ctr"/>
+              <a:endParaRPr lang="en-US">
+                <a:solidFill>
+                  <a:schemeClr val="tx1"/>
+                </a:solidFill>
+              </a:endParaRPr>
+            </a:p>
+          </p:txBody>
+        </p:sp>
+        <p:sp>
+          <p:nvSpPr>
+            <p:cNvPr id="5" name="Freeform 4"/>
+            <p:cNvSpPr/>
+            <p:nvPr/>
+          </p:nvSpPr>
+          <p:spPr>
+            <a:xfrm rot="16200000">
+              <a:off x="1495621" y="4541367"/>
+              <a:ext cx="277879" cy="1695542"/>
+            </a:xfrm>
+            <a:custGeom>
+              <a:avLst/>
+              <a:gdLst>
+                <a:gd name="connsiteX0" fmla="*/ 386787 w 386787"/>
+                <a:gd name="connsiteY0" fmla="*/ 2684760 h 2684760"/>
+                <a:gd name="connsiteX1" fmla="*/ 0 w 386787"/>
+                <a:gd name="connsiteY1" fmla="*/ 1342380 h 2684760"/>
+                <a:gd name="connsiteX2" fmla="*/ 386787 w 386787"/>
+                <a:gd name="connsiteY2" fmla="*/ 0 h 2684760"/>
+                <a:gd name="connsiteX3" fmla="*/ 386787 w 386787"/>
+                <a:gd name="connsiteY3" fmla="*/ 400971 h 2684760"/>
+                <a:gd name="connsiteX4" fmla="*/ 115534 w 386787"/>
+                <a:gd name="connsiteY4" fmla="*/ 1342380 h 2684760"/>
+                <a:gd name="connsiteX5" fmla="*/ 386787 w 386787"/>
+                <a:gd name="connsiteY5" fmla="*/ 2283789 h 2684760"/>
+              </a:gdLst>
+              <a:ahLst/>
+              <a:cxnLst>
+                <a:cxn ang="0">
+                  <a:pos x="connsiteX0" y="connsiteY0"/>
+                </a:cxn>
+                <a:cxn ang="0">
+                  <a:pos x="connsiteX1" y="connsiteY1"/>
+                </a:cxn>
+                <a:cxn ang="0">
+                  <a:pos x="connsiteX2" y="connsiteY2"/>
+                </a:cxn>
+                <a:cxn ang="0">
+                  <a:pos x="connsiteX3" y="connsiteY3"/>
+                </a:cxn>
+                <a:cxn ang="0">
+                  <a:pos x="connsiteX4" y="connsiteY4"/>
+                </a:cxn>
+                <a:cxn ang="0">
+                  <a:pos x="connsiteX5" y="connsiteY5"/>
+                </a:cxn>
+              </a:cxnLst>
+              <a:rect l="l" t="t" r="r" b="b"/>
+              <a:pathLst>
+                <a:path w="386787" h="2684760">
+                  <a:moveTo>
+                    <a:pt x="386787" y="2684760"/>
+                  </a:moveTo>
+                  <a:cubicBezTo>
+                    <a:pt x="173170" y="2684760"/>
+                    <a:pt x="0" y="2083756"/>
+                    <a:pt x="0" y="1342380"/>
+                  </a:cubicBezTo>
+                  <a:cubicBezTo>
+                    <a:pt x="0" y="601004"/>
+                    <a:pt x="173170" y="0"/>
+                    <a:pt x="386787" y="0"/>
+                  </a:cubicBezTo>
+                  <a:lnTo>
+                    <a:pt x="386787" y="400971"/>
+                  </a:lnTo>
+                  <a:cubicBezTo>
+                    <a:pt x="236978" y="400971"/>
+                    <a:pt x="115534" y="822454"/>
+                    <a:pt x="115534" y="1342380"/>
+                  </a:cubicBezTo>
+                  <a:cubicBezTo>
+                    <a:pt x="115534" y="1862306"/>
+                    <a:pt x="236978" y="2283789"/>
+                    <a:pt x="386787" y="2283789"/>
+                  </a:cubicBezTo>
+                  <a:close/>
+                </a:path>
+              </a:pathLst>
+            </a:custGeom>
+            <a:solidFill>
+              <a:schemeClr val="bg1"/>
+            </a:solidFill>
+            <a:ln w="127000">
+              <a:noFill/>
+            </a:ln>
+          </p:spPr>
+          <p:style>
+            <a:lnRef idx="2">
+              <a:schemeClr val="accent1">
+                <a:shade val="50000"/>
+              </a:schemeClr>
+            </a:lnRef>
+            <a:fillRef idx="1">
+              <a:schemeClr val="accent1"/>
+            </a:fillRef>
+            <a:effectRef idx="0">
+              <a:schemeClr val="accent1"/>
+            </a:effectRef>
+            <a:fontRef idx="minor">
+              <a:schemeClr val="lt1"/>
+            </a:fontRef>
+          </p:style>
+          <p:txBody>
+            <a:bodyPr rtlCol="0" anchor="ctr"/>
+            <a:lstStyle/>
+            <a:p>
+              <a:pPr algn="ctr"/>
+              <a:endParaRPr lang="en-US"/>
+            </a:p>
+          </p:txBody>
+        </p:sp>
+      </p:grpSp>
+    </p:spTree>
+    <p:extLst>
+      <p:ext uri="{BB962C8B-B14F-4D97-AF65-F5344CB8AC3E}">
+        <p14:creationId xmlns:p14="http://schemas.microsoft.com/office/powerpoint/2010/main" val="247285593"/>
+      </p:ext>
+    </p:extLst>
+  </p:cSld>
+  <p:clrMapOvr>
+    <a:masterClrMapping/>
+  </p:clrMapOvr>
+</p:sld>
+</file>
+
+<file path=ppt/slides/slide4.xml><?xml version="1.0" encoding="utf-8"?>
+<p:sld xmlns:a="http://schemas.openxmlformats.org/drawingml/2006/main" xmlns:r="http://schemas.openxmlformats.org/officeDocument/2006/relationships" xmlns:p="http://schemas.openxmlformats.org/presentationml/2006/main">
+  <p:cSld>
+    <p:spTree>
+      <p:nvGrpSpPr>
+        <p:cNvPr id="1" name=""/>
+        <p:cNvGrpSpPr/>
+        <p:nvPr/>
+      </p:nvGrpSpPr>
+      <p:grpSpPr>
+        <a:xfrm>
+          <a:off x="0" y="0"/>
+          <a:ext cx="0" cy="0"/>
+          <a:chOff x="0" y="0"/>
+          <a:chExt cx="0" cy="0"/>
+        </a:xfrm>
+      </p:grpSpPr>
+      <p:sp>
+        <p:nvSpPr>
           <p:cNvPr id="5" name="Rectangle 4"/>
           <p:cNvSpPr/>
           <p:nvPr/>
@@ -9483,7 +9973,7 @@
 </p:sld>
 </file>
 
-<file path=ppt/slides/slide4.xml><?xml version="1.0" encoding="utf-8"?>
+<file path=ppt/slides/slide5.xml><?xml version="1.0" encoding="utf-8"?>
 <p:sld xmlns:a="http://schemas.openxmlformats.org/drawingml/2006/main" xmlns:r="http://schemas.openxmlformats.org/officeDocument/2006/relationships" xmlns:p="http://schemas.openxmlformats.org/presentationml/2006/main">
   <p:cSld>
     <p:spTree>
@@ -9717,7 +10207,7 @@
 </p:sld>
 </file>
 
-<file path=ppt/slides/slide5.xml><?xml version="1.0" encoding="utf-8"?>
+<file path=ppt/slides/slide6.xml><?xml version="1.0" encoding="utf-8"?>
 <p:sld xmlns:a="http://schemas.openxmlformats.org/drawingml/2006/main" xmlns:r="http://schemas.openxmlformats.org/officeDocument/2006/relationships" xmlns:p="http://schemas.openxmlformats.org/presentationml/2006/main">
   <p:cSld>
     <p:spTree>
@@ -10025,7 +10515,7 @@
 </p:sld>
 </file>
 
-<file path=ppt/slides/slide6.xml><?xml version="1.0" encoding="utf-8"?>
+<file path=ppt/slides/slide7.xml><?xml version="1.0" encoding="utf-8"?>
 <p:sld xmlns:a="http://schemas.openxmlformats.org/drawingml/2006/main" xmlns:r="http://schemas.openxmlformats.org/officeDocument/2006/relationships" xmlns:p="http://schemas.openxmlformats.org/presentationml/2006/main">
   <p:cSld>
     <p:spTree>
@@ -10107,15 +10597,7 @@
           <a:p>
             <a:r>
               <a:rPr lang="en-US" dirty="0" smtClean="0"/>
-              <a:t>Resume</a:t>
-            </a:r>
-            <a:r>
-              <a:rPr lang="en-US" dirty="0" smtClean="0"/>
-              <a:t> </a:t>
-            </a:r>
-            <a:r>
-              <a:rPr lang="en-US" dirty="0" smtClean="0"/>
-              <a:t>Button</a:t>
+              <a:t>Resume Button</a:t>
             </a:r>
             <a:endParaRPr lang="en-US" dirty="0"/>
           </a:p>
@@ -10326,184 +10808,6 @@
 </p:sld>
 </file>
 
-<file path=ppt/slides/slide7.xml><?xml version="1.0" encoding="utf-8"?>
-<p:sld xmlns:a="http://schemas.openxmlformats.org/drawingml/2006/main" xmlns:r="http://schemas.openxmlformats.org/officeDocument/2006/relationships" xmlns:p="http://schemas.openxmlformats.org/presentationml/2006/main">
-  <p:cSld>
-    <p:spTree>
-      <p:nvGrpSpPr>
-        <p:cNvPr id="1" name=""/>
-        <p:cNvGrpSpPr/>
-        <p:nvPr/>
-      </p:nvGrpSpPr>
-      <p:grpSpPr>
-        <a:xfrm>
-          <a:off x="0" y="0"/>
-          <a:ext cx="0" cy="0"/>
-          <a:chOff x="0" y="0"/>
-          <a:chExt cx="0" cy="0"/>
-        </a:xfrm>
-      </p:grpSpPr>
-      <p:sp>
-        <p:nvSpPr>
-          <p:cNvPr id="5" name="Rectangle 4"/>
-          <p:cNvSpPr/>
-          <p:nvPr/>
-        </p:nvSpPr>
-        <p:spPr>
-          <a:xfrm>
-            <a:off x="116325" y="1524000"/>
-            <a:ext cx="8911349" cy="4983669"/>
-          </a:xfrm>
-          <a:prstGeom prst="rect">
-            <a:avLst/>
-          </a:prstGeom>
-          <a:solidFill>
-            <a:schemeClr val="tx1"/>
-          </a:solidFill>
-          <a:ln>
-            <a:solidFill>
-              <a:schemeClr val="bg1"/>
-            </a:solidFill>
-          </a:ln>
-        </p:spPr>
-        <p:style>
-          <a:lnRef idx="2">
-            <a:schemeClr val="accent1">
-              <a:shade val="50000"/>
-            </a:schemeClr>
-          </a:lnRef>
-          <a:fillRef idx="1">
-            <a:schemeClr val="accent1"/>
-          </a:fillRef>
-          <a:effectRef idx="0">
-            <a:schemeClr val="accent1"/>
-          </a:effectRef>
-          <a:fontRef idx="minor">
-            <a:schemeClr val="lt1"/>
-          </a:fontRef>
-        </p:style>
-        <p:txBody>
-          <a:bodyPr rtlCol="0" anchor="ctr"/>
-          <a:lstStyle/>
-          <a:p>
-            <a:pPr algn="ctr"/>
-            <a:endParaRPr lang="en-US"/>
-          </a:p>
-        </p:txBody>
-      </p:sp>
-      <p:sp>
-        <p:nvSpPr>
-          <p:cNvPr id="2" name="Title 1"/>
-          <p:cNvSpPr>
-            <a:spLocks noGrp="1"/>
-          </p:cNvSpPr>
-          <p:nvPr>
-            <p:ph type="title"/>
-          </p:nvPr>
-        </p:nvSpPr>
-        <p:spPr/>
-        <p:txBody>
-          <a:bodyPr/>
-          <a:lstStyle/>
-          <a:p>
-            <a:r>
-              <a:rPr lang="en-US" dirty="0" smtClean="0"/>
-              <a:t>Connect</a:t>
-            </a:r>
-            <a:r>
-              <a:rPr lang="en-US" dirty="0" smtClean="0"/>
-              <a:t> </a:t>
-            </a:r>
-            <a:r>
-              <a:rPr lang="en-US" dirty="0" smtClean="0"/>
-              <a:t>Button</a:t>
-            </a:r>
-            <a:endParaRPr lang="en-US" dirty="0"/>
-          </a:p>
-        </p:txBody>
-      </p:sp>
-      <p:sp>
-        <p:nvSpPr>
-          <p:cNvPr id="6" name="Rounded Rectangle 5"/>
-          <p:cNvSpPr/>
-          <p:nvPr/>
-        </p:nvSpPr>
-        <p:spPr>
-          <a:xfrm>
-            <a:off x="116324" y="2461634"/>
-            <a:ext cx="8911349" cy="3567600"/>
-          </a:xfrm>
-          <a:prstGeom prst="roundRect">
-            <a:avLst/>
-          </a:prstGeom>
-          <a:solidFill>
-            <a:schemeClr val="bg1">
-              <a:lumMod val="50000"/>
-            </a:schemeClr>
-          </a:solidFill>
-          <a:ln>
-            <a:solidFill>
-              <a:schemeClr val="bg1"/>
-            </a:solidFill>
-          </a:ln>
-          <a:effectLst>
-            <a:innerShdw blurRad="63500" dist="101600" dir="5400000">
-              <a:prstClr val="black">
-                <a:alpha val="83000"/>
-              </a:prstClr>
-            </a:innerShdw>
-          </a:effectLst>
-        </p:spPr>
-        <p:style>
-          <a:lnRef idx="2">
-            <a:schemeClr val="accent1">
-              <a:shade val="50000"/>
-            </a:schemeClr>
-          </a:lnRef>
-          <a:fillRef idx="1">
-            <a:schemeClr val="accent1"/>
-          </a:fillRef>
-          <a:effectRef idx="0">
-            <a:schemeClr val="accent1"/>
-          </a:effectRef>
-          <a:fontRef idx="minor">
-            <a:schemeClr val="lt1"/>
-          </a:fontRef>
-        </p:style>
-        <p:txBody>
-          <a:bodyPr rtlCol="0" anchor="ctr"/>
-          <a:lstStyle/>
-          <a:p>
-            <a:pPr algn="ctr"/>
-            <a:r>
-              <a:rPr lang="en-US" sz="14000" dirty="0" smtClean="0">
-                <a:latin typeface="Helvetica Neue" charset="0"/>
-                <a:ea typeface="Helvetica Neue" charset="0"/>
-                <a:cs typeface="Helvetica Neue" charset="0"/>
-              </a:rPr>
-              <a:t>Connect</a:t>
-            </a:r>
-            <a:endParaRPr lang="en-US" sz="14000" dirty="0">
-              <a:latin typeface="Helvetica Neue" charset="0"/>
-              <a:ea typeface="Helvetica Neue" charset="0"/>
-              <a:cs typeface="Helvetica Neue" charset="0"/>
-            </a:endParaRPr>
-          </a:p>
-        </p:txBody>
-      </p:sp>
-    </p:spTree>
-    <p:extLst>
-      <p:ext uri="{BB962C8B-B14F-4D97-AF65-F5344CB8AC3E}">
-        <p14:creationId xmlns:p14="http://schemas.microsoft.com/office/powerpoint/2010/main" val="2120629784"/>
-      </p:ext>
-    </p:extLst>
-  </p:cSld>
-  <p:clrMapOvr>
-    <a:masterClrMapping/>
-  </p:clrMapOvr>
-</p:sld>
-</file>
-
 <file path=ppt/slides/slide8.xml><?xml version="1.0" encoding="utf-8"?>
 <p:sld xmlns:a="http://schemas.openxmlformats.org/drawingml/2006/main" xmlns:r="http://schemas.openxmlformats.org/officeDocument/2006/relationships" xmlns:p="http://schemas.openxmlformats.org/presentationml/2006/main">
   <p:cSld>
@@ -10586,15 +10890,7 @@
           <a:p>
             <a:r>
               <a:rPr lang="en-US" dirty="0" smtClean="0"/>
-              <a:t>Connected</a:t>
-            </a:r>
-            <a:r>
-              <a:rPr lang="en-US" dirty="0" smtClean="0"/>
-              <a:t> </a:t>
-            </a:r>
-            <a:r>
-              <a:rPr lang="en-US" dirty="0" smtClean="0"/>
-              <a:t>Button</a:t>
+              <a:t>Connect Button</a:t>
             </a:r>
             <a:endParaRPr lang="en-US" dirty="0"/>
           </a:p>
@@ -10654,14 +10950,14 @@
           <a:p>
             <a:pPr algn="ctr"/>
             <a:r>
-              <a:rPr lang="en-US" sz="13000" dirty="0" smtClean="0">
+              <a:rPr lang="en-US" sz="14000" dirty="0" smtClean="0">
                 <a:latin typeface="Helvetica Neue" charset="0"/>
                 <a:ea typeface="Helvetica Neue" charset="0"/>
                 <a:cs typeface="Helvetica Neue" charset="0"/>
               </a:rPr>
-              <a:t>Connected</a:t>
+              <a:t>Connect</a:t>
             </a:r>
-            <a:endParaRPr lang="en-US" sz="13000" dirty="0">
+            <a:endParaRPr lang="en-US" sz="14000" dirty="0">
               <a:latin typeface="Helvetica Neue" charset="0"/>
               <a:ea typeface="Helvetica Neue" charset="0"/>
               <a:cs typeface="Helvetica Neue" charset="0"/>
@@ -10672,7 +10968,7 @@
     </p:spTree>
     <p:extLst>
       <p:ext uri="{BB962C8B-B14F-4D97-AF65-F5344CB8AC3E}">
-        <p14:creationId xmlns:p14="http://schemas.microsoft.com/office/powerpoint/2010/main" val="1709132771"/>
+        <p14:creationId xmlns:p14="http://schemas.microsoft.com/office/powerpoint/2010/main" val="2120629784"/>
       </p:ext>
     </p:extLst>
   </p:cSld>
@@ -10701,6 +10997,54 @@
       </p:grpSpPr>
       <p:sp>
         <p:nvSpPr>
+          <p:cNvPr id="5" name="Rectangle 4"/>
+          <p:cNvSpPr/>
+          <p:nvPr/>
+        </p:nvSpPr>
+        <p:spPr>
+          <a:xfrm>
+            <a:off x="116325" y="1524000"/>
+            <a:ext cx="8911349" cy="4983669"/>
+          </a:xfrm>
+          <a:prstGeom prst="rect">
+            <a:avLst/>
+          </a:prstGeom>
+          <a:solidFill>
+            <a:schemeClr val="tx1"/>
+          </a:solidFill>
+          <a:ln>
+            <a:solidFill>
+              <a:schemeClr val="bg1"/>
+            </a:solidFill>
+          </a:ln>
+        </p:spPr>
+        <p:style>
+          <a:lnRef idx="2">
+            <a:schemeClr val="accent1">
+              <a:shade val="50000"/>
+            </a:schemeClr>
+          </a:lnRef>
+          <a:fillRef idx="1">
+            <a:schemeClr val="accent1"/>
+          </a:fillRef>
+          <a:effectRef idx="0">
+            <a:schemeClr val="accent1"/>
+          </a:effectRef>
+          <a:fontRef idx="minor">
+            <a:schemeClr val="lt1"/>
+          </a:fontRef>
+        </p:style>
+        <p:txBody>
+          <a:bodyPr rtlCol="0" anchor="ctr"/>
+          <a:lstStyle/>
+          <a:p>
+            <a:pPr algn="ctr"/>
+            <a:endParaRPr lang="en-US"/>
+          </a:p>
+        </p:txBody>
+      </p:sp>
+      <p:sp>
+        <p:nvSpPr>
           <p:cNvPr id="2" name="Title 1"/>
           <p:cNvSpPr>
             <a:spLocks noGrp="1"/>
@@ -10709,29 +11053,92 @@
             <p:ph type="title"/>
           </p:nvPr>
         </p:nvSpPr>
-        <p:spPr>
-          <a:xfrm>
-            <a:off x="656359" y="2554144"/>
-            <a:ext cx="7886700" cy="1325563"/>
-          </a:xfrm>
-        </p:spPr>
+        <p:spPr/>
         <p:txBody>
           <a:bodyPr/>
           <a:lstStyle/>
           <a:p>
+            <a:r>
+              <a:rPr lang="en-US" dirty="0" smtClean="0"/>
+              <a:t>Connected Button</a:t>
+            </a:r>
+            <a:endParaRPr lang="en-US" dirty="0"/>
+          </a:p>
+        </p:txBody>
+      </p:sp>
+      <p:sp>
+        <p:nvSpPr>
+          <p:cNvPr id="6" name="Rounded Rectangle 5"/>
+          <p:cNvSpPr/>
+          <p:nvPr/>
+        </p:nvSpPr>
+        <p:spPr>
+          <a:xfrm>
+            <a:off x="116324" y="2461634"/>
+            <a:ext cx="8911349" cy="3567600"/>
+          </a:xfrm>
+          <a:prstGeom prst="roundRect">
+            <a:avLst/>
+          </a:prstGeom>
+          <a:solidFill>
+            <a:schemeClr val="bg1">
+              <a:lumMod val="50000"/>
+            </a:schemeClr>
+          </a:solidFill>
+          <a:ln>
+            <a:solidFill>
+              <a:schemeClr val="bg1"/>
+            </a:solidFill>
+          </a:ln>
+          <a:effectLst>
+            <a:innerShdw blurRad="63500" dist="101600" dir="5400000">
+              <a:prstClr val="black">
+                <a:alpha val="83000"/>
+              </a:prstClr>
+            </a:innerShdw>
+          </a:effectLst>
+        </p:spPr>
+        <p:style>
+          <a:lnRef idx="2">
+            <a:schemeClr val="accent1">
+              <a:shade val="50000"/>
+            </a:schemeClr>
+          </a:lnRef>
+          <a:fillRef idx="1">
+            <a:schemeClr val="accent1"/>
+          </a:fillRef>
+          <a:effectRef idx="0">
+            <a:schemeClr val="accent1"/>
+          </a:effectRef>
+          <a:fontRef idx="minor">
+            <a:schemeClr val="lt1"/>
+          </a:fontRef>
+        </p:style>
+        <p:txBody>
+          <a:bodyPr rtlCol="0" anchor="ctr"/>
+          <a:lstStyle/>
+          <a:p>
             <a:pPr algn="ctr"/>
             <a:r>
-              <a:rPr lang="en-US" dirty="0" smtClean="0"/>
-              <a:t>Archive</a:t>
+              <a:rPr lang="en-US" sz="13000" dirty="0" smtClean="0">
+                <a:latin typeface="Helvetica Neue" charset="0"/>
+                <a:ea typeface="Helvetica Neue" charset="0"/>
+                <a:cs typeface="Helvetica Neue" charset="0"/>
+              </a:rPr>
+              <a:t>Connected</a:t>
             </a:r>
-            <a:endParaRPr lang="en-US" dirty="0"/>
+            <a:endParaRPr lang="en-US" sz="13000" dirty="0">
+              <a:latin typeface="Helvetica Neue" charset="0"/>
+              <a:ea typeface="Helvetica Neue" charset="0"/>
+              <a:cs typeface="Helvetica Neue" charset="0"/>
+            </a:endParaRPr>
           </a:p>
         </p:txBody>
       </p:sp>
     </p:spTree>
     <p:extLst>
       <p:ext uri="{BB962C8B-B14F-4D97-AF65-F5344CB8AC3E}">
-        <p14:creationId xmlns:p14="http://schemas.microsoft.com/office/powerpoint/2010/main" val="1565272403"/>
+        <p14:creationId xmlns:p14="http://schemas.microsoft.com/office/powerpoint/2010/main" val="1709132771"/>
       </p:ext>
     </p:extLst>
   </p:cSld>

</xml_diff>